<commit_message>
feat: adding slides and labs
</commit_message>
<xml_diff>
--- a/slides/06. Spark Machine Learning - Labs Practice.pptx
+++ b/slides/06. Spark Machine Learning - Labs Practice.pptx
@@ -5,10 +5,10 @@
     <p:sldMasterId id="2147483660" r:id="rId1"/>
   </p:sldMasterIdLst>
   <p:notesMasterIdLst>
-    <p:notesMasterId r:id="rId12"/>
+    <p:notesMasterId r:id="rId22"/>
   </p:notesMasterIdLst>
   <p:handoutMasterIdLst>
-    <p:handoutMasterId r:id="rId13"/>
+    <p:handoutMasterId r:id="rId23"/>
   </p:handoutMasterIdLst>
   <p:sldIdLst>
     <p:sldId id="267" r:id="rId2"/>
@@ -21,6 +21,16 @@
     <p:sldId id="373" r:id="rId9"/>
     <p:sldId id="372" r:id="rId10"/>
     <p:sldId id="377" r:id="rId11"/>
+    <p:sldId id="378" r:id="rId12"/>
+    <p:sldId id="380" r:id="rId13"/>
+    <p:sldId id="381" r:id="rId14"/>
+    <p:sldId id="382" r:id="rId15"/>
+    <p:sldId id="383" r:id="rId16"/>
+    <p:sldId id="384" r:id="rId17"/>
+    <p:sldId id="385" r:id="rId18"/>
+    <p:sldId id="386" r:id="rId19"/>
+    <p:sldId id="387" r:id="rId20"/>
+    <p:sldId id="379" r:id="rId21"/>
   </p:sldIdLst>
   <p:sldSz cx="12192000" cy="6858000"/>
   <p:notesSz cx="6858000" cy="9144000"/>
@@ -133,7 +143,7 @@
 <file path=ppt/revisionInfo.xml><?xml version="1.0" encoding="utf-8"?>
 <p1510:revInfo xmlns:a="http://schemas.openxmlformats.org/drawingml/2006/main" xmlns:r="http://schemas.openxmlformats.org/officeDocument/2006/relationships" xmlns:p1510="http://schemas.microsoft.com/office/powerpoint/2015/10/main">
   <p1510:revLst>
-    <p1510:client id="{FDDC0428-D018-4BCB-B4CA-3CE88CF2E00F}" v="21" dt="2024-11-14T14:40:24.965"/>
+    <p1510:client id="{FDDC0428-D018-4BCB-B4CA-3CE88CF2E00F}" v="100" dt="2024-11-20T15:50:06.279"/>
   </p1510:revLst>
 </p1510:revInfo>
 </file>
@@ -4784,7 +4794,7 @@
   <pc:docChgLst>
     <pc:chgData name="Hoang The" userId="9f16f8d006165ab0" providerId="LiveId" clId="{FDDC0428-D018-4BCB-B4CA-3CE88CF2E00F}"/>
     <pc:docChg chg="undo custSel addSld delSld modSld sldOrd">
-      <pc:chgData name="Hoang The" userId="9f16f8d006165ab0" providerId="LiveId" clId="{FDDC0428-D018-4BCB-B4CA-3CE88CF2E00F}" dt="2024-11-16T01:30:57.670" v="438" actId="20577"/>
+      <pc:chgData name="Hoang The" userId="9f16f8d006165ab0" providerId="LiveId" clId="{FDDC0428-D018-4BCB-B4CA-3CE88CF2E00F}" dt="2024-11-20T15:51:29.881" v="1194" actId="47"/>
       <pc:docMkLst>
         <pc:docMk/>
       </pc:docMkLst>
@@ -5098,8 +5108,8 @@
           <pc:sldMk cId="263983027" sldId="372"/>
         </pc:sldMkLst>
       </pc:sldChg>
-      <pc:sldChg chg="modSp add mod">
-        <pc:chgData name="Hoang The" userId="9f16f8d006165ab0" providerId="LiveId" clId="{FDDC0428-D018-4BCB-B4CA-3CE88CF2E00F}" dt="2024-11-13T16:02:16.134" v="316" actId="20577"/>
+      <pc:sldChg chg="addSp delSp modSp add mod">
+        <pc:chgData name="Hoang The" userId="9f16f8d006165ab0" providerId="LiveId" clId="{FDDC0428-D018-4BCB-B4CA-3CE88CF2E00F}" dt="2024-11-19T15:32:01.793" v="630" actId="14100"/>
         <pc:sldMkLst>
           <pc:docMk/>
           <pc:sldMk cId="1153925937" sldId="372"/>
@@ -5112,6 +5122,22 @@
             <ac:spMk id="6" creationId="{F398E789-0703-8416-063B-7EEC940259D2}"/>
           </ac:spMkLst>
         </pc:spChg>
+        <pc:picChg chg="del">
+          <ac:chgData name="Hoang The" userId="9f16f8d006165ab0" providerId="LiveId" clId="{FDDC0428-D018-4BCB-B4CA-3CE88CF2E00F}" dt="2024-11-19T15:31:52.285" v="626" actId="478"/>
+          <ac:picMkLst>
+            <pc:docMk/>
+            <pc:sldMk cId="1153925937" sldId="372"/>
+            <ac:picMk id="1026" creationId="{3A63751C-4D1E-81E0-35C2-04233B2B54C8}"/>
+          </ac:picMkLst>
+        </pc:picChg>
+        <pc:picChg chg="add mod">
+          <ac:chgData name="Hoang The" userId="9f16f8d006165ab0" providerId="LiveId" clId="{FDDC0428-D018-4BCB-B4CA-3CE88CF2E00F}" dt="2024-11-19T15:32:01.793" v="630" actId="14100"/>
+          <ac:picMkLst>
+            <pc:docMk/>
+            <pc:sldMk cId="1153925937" sldId="372"/>
+            <ac:picMk id="3074" creationId="{0DDD36D9-D5B1-D22D-5B43-9395E22DFBA1}"/>
+          </ac:picMkLst>
+        </pc:picChg>
       </pc:sldChg>
       <pc:sldChg chg="add">
         <pc:chgData name="Hoang The" userId="9f16f8d006165ab0" providerId="LiveId" clId="{FDDC0428-D018-4BCB-B4CA-3CE88CF2E00F}" dt="2024-11-14T14:39:55.052" v="317" actId="2890"/>
@@ -5187,6 +5213,466 @@
             <ac:spMk id="6" creationId="{CB7468A0-5B1F-806A-4D1D-C13667D80575}"/>
           </ac:spMkLst>
         </pc:spChg>
+      </pc:sldChg>
+      <pc:sldChg chg="addSp delSp modSp add mod ord">
+        <pc:chgData name="Hoang The" userId="9f16f8d006165ab0" providerId="LiveId" clId="{FDDC0428-D018-4BCB-B4CA-3CE88CF2E00F}" dt="2024-11-19T15:57:35.465" v="881"/>
+        <pc:sldMkLst>
+          <pc:docMk/>
+          <pc:sldMk cId="1088662929" sldId="378"/>
+        </pc:sldMkLst>
+        <pc:spChg chg="mod">
+          <ac:chgData name="Hoang The" userId="9f16f8d006165ab0" providerId="LiveId" clId="{FDDC0428-D018-4BCB-B4CA-3CE88CF2E00F}" dt="2024-11-19T14:49:12.813" v="455" actId="20577"/>
+          <ac:spMkLst>
+            <pc:docMk/>
+            <pc:sldMk cId="1088662929" sldId="378"/>
+            <ac:spMk id="2" creationId="{16F22247-7F36-27F3-1586-3CB4E7CC59BE}"/>
+          </ac:spMkLst>
+        </pc:spChg>
+        <pc:spChg chg="mod">
+          <ac:chgData name="Hoang The" userId="9f16f8d006165ab0" providerId="LiveId" clId="{FDDC0428-D018-4BCB-B4CA-3CE88CF2E00F}" dt="2024-11-19T15:57:35.465" v="881"/>
+          <ac:spMkLst>
+            <pc:docMk/>
+            <pc:sldMk cId="1088662929" sldId="378"/>
+            <ac:spMk id="6" creationId="{CEBAFEFD-02CE-DD8B-822E-35E56BA0F27E}"/>
+          </ac:spMkLst>
+        </pc:spChg>
+        <pc:picChg chg="add mod">
+          <ac:chgData name="Hoang The" userId="9f16f8d006165ab0" providerId="LiveId" clId="{FDDC0428-D018-4BCB-B4CA-3CE88CF2E00F}" dt="2024-11-19T15:16:30.841" v="492" actId="1076"/>
+          <ac:picMkLst>
+            <pc:docMk/>
+            <pc:sldMk cId="1088662929" sldId="378"/>
+            <ac:picMk id="3" creationId="{228B4AA4-DE12-24FB-5E4C-B2F6013A99EA}"/>
+          </ac:picMkLst>
+        </pc:picChg>
+        <pc:picChg chg="del">
+          <ac:chgData name="Hoang The" userId="9f16f8d006165ab0" providerId="LiveId" clId="{FDDC0428-D018-4BCB-B4CA-3CE88CF2E00F}" dt="2024-11-19T14:50:55.172" v="460" actId="478"/>
+          <ac:picMkLst>
+            <pc:docMk/>
+            <pc:sldMk cId="1088662929" sldId="378"/>
+            <ac:picMk id="1026" creationId="{B885F74B-1427-80D0-90E6-908D260D3FE6}"/>
+          </ac:picMkLst>
+        </pc:picChg>
+      </pc:sldChg>
+      <pc:sldChg chg="delSp modSp add mod">
+        <pc:chgData name="Hoang The" userId="9f16f8d006165ab0" providerId="LiveId" clId="{FDDC0428-D018-4BCB-B4CA-3CE88CF2E00F}" dt="2024-11-19T16:24:37.411" v="1152" actId="12"/>
+        <pc:sldMkLst>
+          <pc:docMk/>
+          <pc:sldMk cId="935775528" sldId="379"/>
+        </pc:sldMkLst>
+        <pc:spChg chg="mod">
+          <ac:chgData name="Hoang The" userId="9f16f8d006165ab0" providerId="LiveId" clId="{FDDC0428-D018-4BCB-B4CA-3CE88CF2E00F}" dt="2024-11-19T16:23:46.045" v="1131" actId="20577"/>
+          <ac:spMkLst>
+            <pc:docMk/>
+            <pc:sldMk cId="935775528" sldId="379"/>
+            <ac:spMk id="2" creationId="{6B63EE54-E621-5156-8EE2-6382A4AEFB06}"/>
+          </ac:spMkLst>
+        </pc:spChg>
+        <pc:spChg chg="mod">
+          <ac:chgData name="Hoang The" userId="9f16f8d006165ab0" providerId="LiveId" clId="{FDDC0428-D018-4BCB-B4CA-3CE88CF2E00F}" dt="2024-11-19T16:24:37.411" v="1152" actId="12"/>
+          <ac:spMkLst>
+            <pc:docMk/>
+            <pc:sldMk cId="935775528" sldId="379"/>
+            <ac:spMk id="6" creationId="{CDFBCCA0-66E3-33F7-DAF9-DB403299760A}"/>
+          </ac:spMkLst>
+        </pc:spChg>
+        <pc:picChg chg="del">
+          <ac:chgData name="Hoang The" userId="9f16f8d006165ab0" providerId="LiveId" clId="{FDDC0428-D018-4BCB-B4CA-3CE88CF2E00F}" dt="2024-11-19T14:50:35.982" v="459" actId="478"/>
+          <ac:picMkLst>
+            <pc:docMk/>
+            <pc:sldMk cId="935775528" sldId="379"/>
+            <ac:picMk id="1026" creationId="{5A137417-56D5-C8CE-7316-6479BC8139A6}"/>
+          </ac:picMkLst>
+        </pc:picChg>
+      </pc:sldChg>
+      <pc:sldChg chg="addSp delSp modSp add mod">
+        <pc:chgData name="Hoang The" userId="9f16f8d006165ab0" providerId="LiveId" clId="{FDDC0428-D018-4BCB-B4CA-3CE88CF2E00F}" dt="2024-11-19T15:56:29.911" v="875" actId="20577"/>
+        <pc:sldMkLst>
+          <pc:docMk/>
+          <pc:sldMk cId="1541829334" sldId="380"/>
+        </pc:sldMkLst>
+        <pc:spChg chg="add">
+          <ac:chgData name="Hoang The" userId="9f16f8d006165ab0" providerId="LiveId" clId="{FDDC0428-D018-4BCB-B4CA-3CE88CF2E00F}" dt="2024-11-19T15:28:53.418" v="618"/>
+          <ac:spMkLst>
+            <pc:docMk/>
+            <pc:sldMk cId="1541829334" sldId="380"/>
+            <ac:spMk id="4" creationId="{E4B8192C-35A2-0580-ACE5-25CF8F383999}"/>
+          </ac:spMkLst>
+        </pc:spChg>
+        <pc:spChg chg="add">
+          <ac:chgData name="Hoang The" userId="9f16f8d006165ab0" providerId="LiveId" clId="{FDDC0428-D018-4BCB-B4CA-3CE88CF2E00F}" dt="2024-11-19T15:29:38.663" v="619"/>
+          <ac:spMkLst>
+            <pc:docMk/>
+            <pc:sldMk cId="1541829334" sldId="380"/>
+            <ac:spMk id="5" creationId="{21D19D79-85F0-B467-6246-3AD38FE6CDA9}"/>
+          </ac:spMkLst>
+        </pc:spChg>
+        <pc:spChg chg="mod">
+          <ac:chgData name="Hoang The" userId="9f16f8d006165ab0" providerId="LiveId" clId="{FDDC0428-D018-4BCB-B4CA-3CE88CF2E00F}" dt="2024-11-19T15:56:29.911" v="875" actId="20577"/>
+          <ac:spMkLst>
+            <pc:docMk/>
+            <pc:sldMk cId="1541829334" sldId="380"/>
+            <ac:spMk id="6" creationId="{7C4CC8E5-7FE3-2AB1-45D0-19BFA4EBAE7D}"/>
+          </ac:spMkLst>
+        </pc:spChg>
+        <pc:picChg chg="del">
+          <ac:chgData name="Hoang The" userId="9f16f8d006165ab0" providerId="LiveId" clId="{FDDC0428-D018-4BCB-B4CA-3CE88CF2E00F}" dt="2024-11-19T15:28:36.416" v="617" actId="478"/>
+          <ac:picMkLst>
+            <pc:docMk/>
+            <pc:sldMk cId="1541829334" sldId="380"/>
+            <ac:picMk id="3" creationId="{9024919D-8D0F-DE7C-BA3B-077DD049BEAE}"/>
+          </ac:picMkLst>
+        </pc:picChg>
+        <pc:picChg chg="add del mod">
+          <ac:chgData name="Hoang The" userId="9f16f8d006165ab0" providerId="LiveId" clId="{FDDC0428-D018-4BCB-B4CA-3CE88CF2E00F}" dt="2024-11-19T15:30:05.744" v="625" actId="21"/>
+          <ac:picMkLst>
+            <pc:docMk/>
+            <pc:sldMk cId="1541829334" sldId="380"/>
+            <ac:picMk id="8" creationId="{DF968B54-B55C-E835-2921-8C29E2236981}"/>
+          </ac:picMkLst>
+        </pc:picChg>
+      </pc:sldChg>
+      <pc:sldChg chg="addSp delSp modSp add mod">
+        <pc:chgData name="Hoang The" userId="9f16f8d006165ab0" providerId="LiveId" clId="{FDDC0428-D018-4BCB-B4CA-3CE88CF2E00F}" dt="2024-11-19T15:23:29.078" v="560" actId="20577"/>
+        <pc:sldMkLst>
+          <pc:docMk/>
+          <pc:sldMk cId="583165284" sldId="381"/>
+        </pc:sldMkLst>
+        <pc:spChg chg="add del mod">
+          <ac:chgData name="Hoang The" userId="9f16f8d006165ab0" providerId="LiveId" clId="{FDDC0428-D018-4BCB-B4CA-3CE88CF2E00F}" dt="2024-11-19T15:23:20.178" v="546" actId="478"/>
+          <ac:spMkLst>
+            <pc:docMk/>
+            <pc:sldMk cId="583165284" sldId="381"/>
+            <ac:spMk id="5" creationId="{1727B999-0898-3ACB-8A9B-C41055E41CD2}"/>
+          </ac:spMkLst>
+        </pc:spChg>
+        <pc:spChg chg="del mod">
+          <ac:chgData name="Hoang The" userId="9f16f8d006165ab0" providerId="LiveId" clId="{FDDC0428-D018-4BCB-B4CA-3CE88CF2E00F}" dt="2024-11-19T15:23:15.214" v="544" actId="478"/>
+          <ac:spMkLst>
+            <pc:docMk/>
+            <pc:sldMk cId="583165284" sldId="381"/>
+            <ac:spMk id="6" creationId="{2E9ABE87-8978-9FE0-18A6-F6BF3E159838}"/>
+          </ac:spMkLst>
+        </pc:spChg>
+        <pc:spChg chg="add mod">
+          <ac:chgData name="Hoang The" userId="9f16f8d006165ab0" providerId="LiveId" clId="{FDDC0428-D018-4BCB-B4CA-3CE88CF2E00F}" dt="2024-11-19T15:23:29.078" v="560" actId="20577"/>
+          <ac:spMkLst>
+            <pc:docMk/>
+            <pc:sldMk cId="583165284" sldId="381"/>
+            <ac:spMk id="7" creationId="{B778B476-6B74-057D-546D-32FAE315B6A8}"/>
+          </ac:spMkLst>
+        </pc:spChg>
+        <pc:picChg chg="del">
+          <ac:chgData name="Hoang The" userId="9f16f8d006165ab0" providerId="LiveId" clId="{FDDC0428-D018-4BCB-B4CA-3CE88CF2E00F}" dt="2024-11-19T15:18:56.436" v="541" actId="478"/>
+          <ac:picMkLst>
+            <pc:docMk/>
+            <pc:sldMk cId="583165284" sldId="381"/>
+            <ac:picMk id="3" creationId="{1E143A60-3AAB-D659-ABBE-E3E4434EB3FE}"/>
+          </ac:picMkLst>
+        </pc:picChg>
+      </pc:sldChg>
+      <pc:sldChg chg="addSp delSp modSp add mod">
+        <pc:chgData name="Hoang The" userId="9f16f8d006165ab0" providerId="LiveId" clId="{FDDC0428-D018-4BCB-B4CA-3CE88CF2E00F}" dt="2024-11-19T15:56:34.592" v="876" actId="20577"/>
+        <pc:sldMkLst>
+          <pc:docMk/>
+          <pc:sldMk cId="1262947505" sldId="382"/>
+        </pc:sldMkLst>
+        <pc:spChg chg="mod">
+          <ac:chgData name="Hoang The" userId="9f16f8d006165ab0" providerId="LiveId" clId="{FDDC0428-D018-4BCB-B4CA-3CE88CF2E00F}" dt="2024-11-19T15:24:41.881" v="612"/>
+          <ac:spMkLst>
+            <pc:docMk/>
+            <pc:sldMk cId="1262947505" sldId="382"/>
+            <ac:spMk id="2" creationId="{0DEEB00A-9EBA-F986-1BDD-17D8622D2F4A}"/>
+          </ac:spMkLst>
+        </pc:spChg>
+        <pc:spChg chg="mod">
+          <ac:chgData name="Hoang The" userId="9f16f8d006165ab0" providerId="LiveId" clId="{FDDC0428-D018-4BCB-B4CA-3CE88CF2E00F}" dt="2024-11-19T15:56:34.592" v="876" actId="20577"/>
+          <ac:spMkLst>
+            <pc:docMk/>
+            <pc:sldMk cId="1262947505" sldId="382"/>
+            <ac:spMk id="6" creationId="{1F166BF5-A7D6-14F2-CDE3-7B845A37A7F6}"/>
+          </ac:spMkLst>
+        </pc:spChg>
+        <pc:picChg chg="del">
+          <ac:chgData name="Hoang The" userId="9f16f8d006165ab0" providerId="LiveId" clId="{FDDC0428-D018-4BCB-B4CA-3CE88CF2E00F}" dt="2024-11-19T15:37:29.587" v="686" actId="478"/>
+          <ac:picMkLst>
+            <pc:docMk/>
+            <pc:sldMk cId="1262947505" sldId="382"/>
+            <ac:picMk id="3" creationId="{B8F593FD-2B6E-2040-63B1-7B4C2A24C265}"/>
+          </ac:picMkLst>
+        </pc:picChg>
+        <pc:picChg chg="add del mod">
+          <ac:chgData name="Hoang The" userId="9f16f8d006165ab0" providerId="LiveId" clId="{FDDC0428-D018-4BCB-B4CA-3CE88CF2E00F}" dt="2024-11-19T15:46:38.948" v="793" actId="478"/>
+          <ac:picMkLst>
+            <pc:docMk/>
+            <pc:sldMk cId="1262947505" sldId="382"/>
+            <ac:picMk id="5" creationId="{74085B98-462E-063D-A6C7-48B29515C71B}"/>
+          </ac:picMkLst>
+        </pc:picChg>
+        <pc:picChg chg="add mod">
+          <ac:chgData name="Hoang The" userId="9f16f8d006165ab0" providerId="LiveId" clId="{FDDC0428-D018-4BCB-B4CA-3CE88CF2E00F}" dt="2024-11-19T15:46:36.442" v="791" actId="1076"/>
+          <ac:picMkLst>
+            <pc:docMk/>
+            <pc:sldMk cId="1262947505" sldId="382"/>
+            <ac:picMk id="8" creationId="{EC9A5A4E-6D7C-632D-B1F8-8A8D5C295D4A}"/>
+          </ac:picMkLst>
+        </pc:picChg>
+      </pc:sldChg>
+      <pc:sldChg chg="addSp delSp modSp add mod replId">
+        <pc:chgData name="Hoang The" userId="9f16f8d006165ab0" providerId="LiveId" clId="{FDDC0428-D018-4BCB-B4CA-3CE88CF2E00F}" dt="2024-11-19T15:56:44.961" v="878" actId="20577"/>
+        <pc:sldMkLst>
+          <pc:docMk/>
+          <pc:sldMk cId="3561995622" sldId="383"/>
+        </pc:sldMkLst>
+        <pc:spChg chg="mod">
+          <ac:chgData name="Hoang The" userId="9f16f8d006165ab0" providerId="LiveId" clId="{FDDC0428-D018-4BCB-B4CA-3CE88CF2E00F}" dt="2024-11-19T15:24:20.732" v="583" actId="20577"/>
+          <ac:spMkLst>
+            <pc:docMk/>
+            <pc:sldMk cId="3561995622" sldId="383"/>
+            <ac:spMk id="2" creationId="{D1F5F4B3-A6E3-6ACF-FFD8-793DE6A3861E}"/>
+          </ac:spMkLst>
+        </pc:spChg>
+        <pc:spChg chg="mod">
+          <ac:chgData name="Hoang The" userId="9f16f8d006165ab0" providerId="LiveId" clId="{FDDC0428-D018-4BCB-B4CA-3CE88CF2E00F}" dt="2024-11-19T15:56:44.961" v="878" actId="20577"/>
+          <ac:spMkLst>
+            <pc:docMk/>
+            <pc:sldMk cId="3561995622" sldId="383"/>
+            <ac:spMk id="6" creationId="{C77F443A-686E-45F3-E4CE-91E089EDBD2A}"/>
+          </ac:spMkLst>
+        </pc:spChg>
+        <pc:picChg chg="del">
+          <ac:chgData name="Hoang The" userId="9f16f8d006165ab0" providerId="LiveId" clId="{FDDC0428-D018-4BCB-B4CA-3CE88CF2E00F}" dt="2024-11-19T15:49:17.005" v="794" actId="478"/>
+          <ac:picMkLst>
+            <pc:docMk/>
+            <pc:sldMk cId="3561995622" sldId="383"/>
+            <ac:picMk id="3" creationId="{CD883666-F15B-4247-62C3-845AFE0B5350}"/>
+          </ac:picMkLst>
+        </pc:picChg>
+        <pc:picChg chg="add del mod">
+          <ac:chgData name="Hoang The" userId="9f16f8d006165ab0" providerId="LiveId" clId="{FDDC0428-D018-4BCB-B4CA-3CE88CF2E00F}" dt="2024-11-19T15:51:25.043" v="804" actId="478"/>
+          <ac:picMkLst>
+            <pc:docMk/>
+            <pc:sldMk cId="3561995622" sldId="383"/>
+            <ac:picMk id="4098" creationId="{FFB70D90-E533-400A-0C4C-F521380C200B}"/>
+          </ac:picMkLst>
+        </pc:picChg>
+      </pc:sldChg>
+      <pc:sldChg chg="modSp add mod replId">
+        <pc:chgData name="Hoang The" userId="9f16f8d006165ab0" providerId="LiveId" clId="{FDDC0428-D018-4BCB-B4CA-3CE88CF2E00F}" dt="2024-11-19T15:24:37.184" v="611" actId="20577"/>
+        <pc:sldMkLst>
+          <pc:docMk/>
+          <pc:sldMk cId="1074798282" sldId="384"/>
+        </pc:sldMkLst>
+        <pc:spChg chg="mod">
+          <ac:chgData name="Hoang The" userId="9f16f8d006165ab0" providerId="LiveId" clId="{FDDC0428-D018-4BCB-B4CA-3CE88CF2E00F}" dt="2024-11-19T15:24:29.860" v="584"/>
+          <ac:spMkLst>
+            <pc:docMk/>
+            <pc:sldMk cId="1074798282" sldId="384"/>
+            <ac:spMk id="2" creationId="{304CA2DE-531B-321B-2E54-A0B088CC2824}"/>
+          </ac:spMkLst>
+        </pc:spChg>
+        <pc:spChg chg="mod">
+          <ac:chgData name="Hoang The" userId="9f16f8d006165ab0" providerId="LiveId" clId="{FDDC0428-D018-4BCB-B4CA-3CE88CF2E00F}" dt="2024-11-19T15:24:37.184" v="611" actId="20577"/>
+          <ac:spMkLst>
+            <pc:docMk/>
+            <pc:sldMk cId="1074798282" sldId="384"/>
+            <ac:spMk id="7" creationId="{6D88F5C7-AFFA-D309-A704-67835AAC9486}"/>
+          </ac:spMkLst>
+        </pc:spChg>
+      </pc:sldChg>
+      <pc:sldChg chg="addSp delSp modSp add mod">
+        <pc:chgData name="Hoang The" userId="9f16f8d006165ab0" providerId="LiveId" clId="{FDDC0428-D018-4BCB-B4CA-3CE88CF2E00F}" dt="2024-11-19T16:13:13.293" v="1048" actId="20577"/>
+        <pc:sldMkLst>
+          <pc:docMk/>
+          <pc:sldMk cId="335589322" sldId="385"/>
+        </pc:sldMkLst>
+        <pc:spChg chg="mod">
+          <ac:chgData name="Hoang The" userId="9f16f8d006165ab0" providerId="LiveId" clId="{FDDC0428-D018-4BCB-B4CA-3CE88CF2E00F}" dt="2024-11-19T15:59:01.400" v="906" actId="20577"/>
+          <ac:spMkLst>
+            <pc:docMk/>
+            <pc:sldMk cId="335589322" sldId="385"/>
+            <ac:spMk id="2" creationId="{8BA3EB78-10E2-4548-989F-43F50ED57EA8}"/>
+          </ac:spMkLst>
+        </pc:spChg>
+        <pc:spChg chg="mod">
+          <ac:chgData name="Hoang The" userId="9f16f8d006165ab0" providerId="LiveId" clId="{FDDC0428-D018-4BCB-B4CA-3CE88CF2E00F}" dt="2024-11-19T16:13:13.293" v="1048" actId="20577"/>
+          <ac:spMkLst>
+            <pc:docMk/>
+            <pc:sldMk cId="335589322" sldId="385"/>
+            <ac:spMk id="6" creationId="{E9B58438-FCB4-A85D-8AE7-3F8B200470C8}"/>
+          </ac:spMkLst>
+        </pc:spChg>
+        <pc:picChg chg="del">
+          <ac:chgData name="Hoang The" userId="9f16f8d006165ab0" providerId="LiveId" clId="{FDDC0428-D018-4BCB-B4CA-3CE88CF2E00F}" dt="2024-11-19T16:03:22.832" v="941" actId="478"/>
+          <ac:picMkLst>
+            <pc:docMk/>
+            <pc:sldMk cId="335589322" sldId="385"/>
+            <ac:picMk id="8" creationId="{3ACD3619-D1AD-F00A-6ED6-B122E414EF36}"/>
+          </ac:picMkLst>
+        </pc:picChg>
+        <pc:picChg chg="add mod">
+          <ac:chgData name="Hoang The" userId="9f16f8d006165ab0" providerId="LiveId" clId="{FDDC0428-D018-4BCB-B4CA-3CE88CF2E00F}" dt="2024-11-19T16:11:30.775" v="947" actId="14100"/>
+          <ac:picMkLst>
+            <pc:docMk/>
+            <pc:sldMk cId="335589322" sldId="385"/>
+            <ac:picMk id="5122" creationId="{8B8373AB-CDD2-21F3-16E9-C0DB1EF524AD}"/>
+          </ac:picMkLst>
+        </pc:picChg>
+      </pc:sldChg>
+      <pc:sldChg chg="addSp delSp modSp add mod replId">
+        <pc:chgData name="Hoang The" userId="9f16f8d006165ab0" providerId="LiveId" clId="{FDDC0428-D018-4BCB-B4CA-3CE88CF2E00F}" dt="2024-11-19T16:21:23.777" v="1070" actId="27636"/>
+        <pc:sldMkLst>
+          <pc:docMk/>
+          <pc:sldMk cId="887485827" sldId="386"/>
+        </pc:sldMkLst>
+        <pc:spChg chg="mod">
+          <ac:chgData name="Hoang The" userId="9f16f8d006165ab0" providerId="LiveId" clId="{FDDC0428-D018-4BCB-B4CA-3CE88CF2E00F}" dt="2024-11-19T15:59:06.954" v="907"/>
+          <ac:spMkLst>
+            <pc:docMk/>
+            <pc:sldMk cId="887485827" sldId="386"/>
+            <ac:spMk id="2" creationId="{F86E2391-5106-7E2D-9DB7-2525DB9F2133}"/>
+          </ac:spMkLst>
+        </pc:spChg>
+        <pc:spChg chg="add">
+          <ac:chgData name="Hoang The" userId="9f16f8d006165ab0" providerId="LiveId" clId="{FDDC0428-D018-4BCB-B4CA-3CE88CF2E00F}" dt="2024-11-19T16:16:27.579" v="1052"/>
+          <ac:spMkLst>
+            <pc:docMk/>
+            <pc:sldMk cId="887485827" sldId="386"/>
+            <ac:spMk id="3" creationId="{E1D3C2EE-CFEF-E867-6507-67DD53FBEDE3}"/>
+          </ac:spMkLst>
+        </pc:spChg>
+        <pc:spChg chg="add del">
+          <ac:chgData name="Hoang The" userId="9f16f8d006165ab0" providerId="LiveId" clId="{FDDC0428-D018-4BCB-B4CA-3CE88CF2E00F}" dt="2024-11-19T16:20:59.647" v="1063" actId="478"/>
+          <ac:spMkLst>
+            <pc:docMk/>
+            <pc:sldMk cId="887485827" sldId="386"/>
+            <ac:spMk id="4" creationId="{A3D28663-9C2C-BD90-8002-CFD08F6AD62B}"/>
+          </ac:spMkLst>
+        </pc:spChg>
+        <pc:spChg chg="mod">
+          <ac:chgData name="Hoang The" userId="9f16f8d006165ab0" providerId="LiveId" clId="{FDDC0428-D018-4BCB-B4CA-3CE88CF2E00F}" dt="2024-11-19T16:21:23.777" v="1070" actId="27636"/>
+          <ac:spMkLst>
+            <pc:docMk/>
+            <pc:sldMk cId="887485827" sldId="386"/>
+            <ac:spMk id="6" creationId="{B568D6DB-1586-4398-9D3A-1AC88D93E6EA}"/>
+          </ac:spMkLst>
+        </pc:spChg>
+        <pc:picChg chg="add del mod">
+          <ac:chgData name="Hoang The" userId="9f16f8d006165ab0" providerId="LiveId" clId="{FDDC0428-D018-4BCB-B4CA-3CE88CF2E00F}" dt="2024-11-19T16:20:55.370" v="1061" actId="478"/>
+          <ac:picMkLst>
+            <pc:docMk/>
+            <pc:sldMk cId="887485827" sldId="386"/>
+            <ac:picMk id="6148" creationId="{605E7E96-D8F7-C283-E2B5-D5F46E5BB48F}"/>
+          </ac:picMkLst>
+        </pc:picChg>
+        <pc:picChg chg="add mod">
+          <ac:chgData name="Hoang The" userId="9f16f8d006165ab0" providerId="LiveId" clId="{FDDC0428-D018-4BCB-B4CA-3CE88CF2E00F}" dt="2024-11-19T16:21:20.741" v="1068" actId="1076"/>
+          <ac:picMkLst>
+            <pc:docMk/>
+            <pc:sldMk cId="887485827" sldId="386"/>
+            <ac:picMk id="6152" creationId="{A0950A69-DA8B-F152-FBD1-35EDA24CA72F}"/>
+          </ac:picMkLst>
+        </pc:picChg>
+      </pc:sldChg>
+      <pc:sldChg chg="modSp add mod replId">
+        <pc:chgData name="Hoang The" userId="9f16f8d006165ab0" providerId="LiveId" clId="{FDDC0428-D018-4BCB-B4CA-3CE88CF2E00F}" dt="2024-11-19T15:59:17.659" v="930" actId="20577"/>
+        <pc:sldMkLst>
+          <pc:docMk/>
+          <pc:sldMk cId="1183251839" sldId="387"/>
+        </pc:sldMkLst>
+        <pc:spChg chg="mod">
+          <ac:chgData name="Hoang The" userId="9f16f8d006165ab0" providerId="LiveId" clId="{FDDC0428-D018-4BCB-B4CA-3CE88CF2E00F}" dt="2024-11-19T15:59:09.165" v="908"/>
+          <ac:spMkLst>
+            <pc:docMk/>
+            <pc:sldMk cId="1183251839" sldId="387"/>
+            <ac:spMk id="2" creationId="{9035A1E7-CD84-B1B7-B513-63FF65CEE01F}"/>
+          </ac:spMkLst>
+        </pc:spChg>
+        <pc:spChg chg="mod">
+          <ac:chgData name="Hoang The" userId="9f16f8d006165ab0" providerId="LiveId" clId="{FDDC0428-D018-4BCB-B4CA-3CE88CF2E00F}" dt="2024-11-19T15:59:17.659" v="930" actId="20577"/>
+          <ac:spMkLst>
+            <pc:docMk/>
+            <pc:sldMk cId="1183251839" sldId="387"/>
+            <ac:spMk id="7" creationId="{500EF554-A0AA-D3AB-EC16-EC387A9A3356}"/>
+          </ac:spMkLst>
+        </pc:spChg>
+      </pc:sldChg>
+      <pc:sldChg chg="addSp delSp modSp add del mod">
+        <pc:chgData name="Hoang The" userId="9f16f8d006165ab0" providerId="LiveId" clId="{FDDC0428-D018-4BCB-B4CA-3CE88CF2E00F}" dt="2024-11-20T15:51:29.881" v="1194" actId="47"/>
+        <pc:sldMkLst>
+          <pc:docMk/>
+          <pc:sldMk cId="3765401591" sldId="388"/>
+        </pc:sldMkLst>
+        <pc:spChg chg="mod">
+          <ac:chgData name="Hoang The" userId="9f16f8d006165ab0" providerId="LiveId" clId="{FDDC0428-D018-4BCB-B4CA-3CE88CF2E00F}" dt="2024-11-20T15:45:07.014" v="1169" actId="20577"/>
+          <ac:spMkLst>
+            <pc:docMk/>
+            <pc:sldMk cId="3765401591" sldId="388"/>
+            <ac:spMk id="2" creationId="{5CC31D3D-3C45-77D2-D2BA-2458D0224268}"/>
+          </ac:spMkLst>
+        </pc:spChg>
+        <pc:spChg chg="add del mod">
+          <ac:chgData name="Hoang The" userId="9f16f8d006165ab0" providerId="LiveId" clId="{FDDC0428-D018-4BCB-B4CA-3CE88CF2E00F}" dt="2024-11-20T15:42:40.315" v="1155" actId="478"/>
+          <ac:spMkLst>
+            <pc:docMk/>
+            <pc:sldMk cId="3765401591" sldId="388"/>
+            <ac:spMk id="4" creationId="{4F696684-7DF7-E0C6-3C13-33AEDAE9412C}"/>
+          </ac:spMkLst>
+        </pc:spChg>
+        <pc:spChg chg="del">
+          <ac:chgData name="Hoang The" userId="9f16f8d006165ab0" providerId="LiveId" clId="{FDDC0428-D018-4BCB-B4CA-3CE88CF2E00F}" dt="2024-11-20T15:42:37.395" v="1154" actId="478"/>
+          <ac:spMkLst>
+            <pc:docMk/>
+            <pc:sldMk cId="3765401591" sldId="388"/>
+            <ac:spMk id="6" creationId="{D311DBF4-EA3E-624F-3DBD-76D20A540805}"/>
+          </ac:spMkLst>
+        </pc:spChg>
+        <pc:picChg chg="add del mod">
+          <ac:chgData name="Hoang The" userId="9f16f8d006165ab0" providerId="LiveId" clId="{FDDC0428-D018-4BCB-B4CA-3CE88CF2E00F}" dt="2024-11-20T15:42:48.818" v="1160" actId="478"/>
+          <ac:picMkLst>
+            <pc:docMk/>
+            <pc:sldMk cId="3765401591" sldId="388"/>
+            <ac:picMk id="7170" creationId="{2579AA7C-E7D0-7963-0F4F-B969FC26EA83}"/>
+          </ac:picMkLst>
+        </pc:picChg>
+        <pc:picChg chg="add mod">
+          <ac:chgData name="Hoang The" userId="9f16f8d006165ab0" providerId="LiveId" clId="{FDDC0428-D018-4BCB-B4CA-3CE88CF2E00F}" dt="2024-11-20T15:47:52.946" v="1176" actId="1076"/>
+          <ac:picMkLst>
+            <pc:docMk/>
+            <pc:sldMk cId="3765401591" sldId="388"/>
+            <ac:picMk id="7172" creationId="{226F677D-D409-A281-B005-6AE9F76DC0CA}"/>
+          </ac:picMkLst>
+        </pc:picChg>
+      </pc:sldChg>
+      <pc:sldChg chg="delSp modSp add del mod ord">
+        <pc:chgData name="Hoang The" userId="9f16f8d006165ab0" providerId="LiveId" clId="{FDDC0428-D018-4BCB-B4CA-3CE88CF2E00F}" dt="2024-11-20T15:51:29.881" v="1194" actId="47"/>
+        <pc:sldMkLst>
+          <pc:docMk/>
+          <pc:sldMk cId="771416987" sldId="389"/>
+        </pc:sldMkLst>
+        <pc:spChg chg="mod">
+          <ac:chgData name="Hoang The" userId="9f16f8d006165ab0" providerId="LiveId" clId="{FDDC0428-D018-4BCB-B4CA-3CE88CF2E00F}" dt="2024-11-20T15:48:15.421" v="1182"/>
+          <ac:spMkLst>
+            <pc:docMk/>
+            <pc:sldMk cId="771416987" sldId="389"/>
+            <ac:spMk id="2" creationId="{67F95FDF-28D2-3D54-83C9-CCDCB5A9555F}"/>
+          </ac:spMkLst>
+        </pc:spChg>
+        <pc:spChg chg="mod">
+          <ac:chgData name="Hoang The" userId="9f16f8d006165ab0" providerId="LiveId" clId="{FDDC0428-D018-4BCB-B4CA-3CE88CF2E00F}" dt="2024-11-20T15:50:18.500" v="1193" actId="14100"/>
+          <ac:spMkLst>
+            <pc:docMk/>
+            <pc:sldMk cId="771416987" sldId="389"/>
+            <ac:spMk id="6" creationId="{631BB5E5-A091-0E10-DFF8-1004448330AB}"/>
+          </ac:spMkLst>
+        </pc:spChg>
+        <pc:picChg chg="del">
+          <ac:chgData name="Hoang The" userId="9f16f8d006165ab0" providerId="LiveId" clId="{FDDC0428-D018-4BCB-B4CA-3CE88CF2E00F}" dt="2024-11-20T15:50:06.279" v="1190" actId="478"/>
+          <ac:picMkLst>
+            <pc:docMk/>
+            <pc:sldMk cId="771416987" sldId="389"/>
+            <ac:picMk id="5122" creationId="{F772FF98-8AAC-4BF9-F7E2-22B3ED8613F9}"/>
+          </ac:picMkLst>
+        </pc:picChg>
       </pc:sldChg>
     </pc:docChg>
   </pc:docChgLst>
@@ -9361,7 +9847,7 @@
           <a:p>
             <a:fld id="{7C0AA17F-CB06-445B-ACD3-321E84E51A80}" type="datetimeFigureOut">
               <a:rPr lang="en-US" smtClean="0"/>
-              <a:t>11/16/2024</a:t>
+              <a:t>11/19/2024</a:t>
             </a:fld>
             <a:endParaRPr lang="en-US" dirty="0"/>
           </a:p>
@@ -9538,7 +10024,7 @@
           <a:p>
             <a:fld id="{B06141C0-BF72-4A20-AFA7-D05563D549B7}" type="datetimeFigureOut">
               <a:rPr lang="en-US" smtClean="0"/>
-              <a:t>11/16/2024</a:t>
+              <a:t>11/19/2024</a:t>
             </a:fld>
             <a:endParaRPr lang="en-US" dirty="0"/>
           </a:p>
@@ -9993,7 +10479,7 @@
           <a:p>
             <a:fld id="{984B7D2A-0DF8-424B-9572-B79AEBB2D9DC}" type="datetimeFigureOut">
               <a:rPr lang="en-US" noProof="0" smtClean="0"/>
-              <a:t>11/16/2024</a:t>
+              <a:t>11/19/2024</a:t>
             </a:fld>
             <a:endParaRPr lang="en-US" noProof="0" dirty="0"/>
           </a:p>
@@ -10320,7 +10806,7 @@
           <a:p>
             <a:fld id="{984B7D2A-0DF8-424B-9572-B79AEBB2D9DC}" type="datetimeFigureOut">
               <a:rPr lang="en-US" noProof="0" smtClean="0"/>
-              <a:t>11/16/2024</a:t>
+              <a:t>11/19/2024</a:t>
             </a:fld>
             <a:endParaRPr lang="en-US" noProof="0" dirty="0"/>
           </a:p>
@@ -10482,7 +10968,7 @@
           <a:p>
             <a:fld id="{984B7D2A-0DF8-424B-9572-B79AEBB2D9DC}" type="datetimeFigureOut">
               <a:rPr lang="en-US" noProof="0" smtClean="0"/>
-              <a:t>11/16/2024</a:t>
+              <a:t>11/19/2024</a:t>
             </a:fld>
             <a:endParaRPr lang="en-US" noProof="0" dirty="0"/>
           </a:p>
@@ -10610,7 +11096,7 @@
           <a:p>
             <a:fld id="{984B7D2A-0DF8-424B-9572-B79AEBB2D9DC}" type="datetimeFigureOut">
               <a:rPr lang="en-US" noProof="0" smtClean="0"/>
-              <a:t>11/16/2024</a:t>
+              <a:t>11/19/2024</a:t>
             </a:fld>
             <a:endParaRPr lang="en-US" noProof="0" dirty="0"/>
           </a:p>
@@ -10931,7 +11417,7 @@
           <a:p>
             <a:fld id="{984B7D2A-0DF8-424B-9572-B79AEBB2D9DC}" type="datetimeFigureOut">
               <a:rPr lang="en-US" noProof="0" smtClean="0"/>
-              <a:t>11/16/2024</a:t>
+              <a:t>11/19/2024</a:t>
             </a:fld>
             <a:endParaRPr lang="en-US" noProof="0" dirty="0"/>
           </a:p>
@@ -11229,7 +11715,7 @@
           <a:p>
             <a:fld id="{984B7D2A-0DF8-424B-9572-B79AEBB2D9DC}" type="datetimeFigureOut">
               <a:rPr lang="en-US" noProof="0" smtClean="0"/>
-              <a:t>11/16/2024</a:t>
+              <a:t>11/19/2024</a:t>
             </a:fld>
             <a:endParaRPr lang="en-US" noProof="0" dirty="0"/>
           </a:p>
@@ -11464,7 +11950,7 @@
           <a:p>
             <a:fld id="{984B7D2A-0DF8-424B-9572-B79AEBB2D9DC}" type="datetimeFigureOut">
               <a:rPr lang="en-US" noProof="0" smtClean="0"/>
-              <a:t>11/16/2024</a:t>
+              <a:t>11/19/2024</a:t>
             </a:fld>
             <a:endParaRPr lang="en-US" noProof="0" dirty="0"/>
           </a:p>
@@ -12146,7 +12632,7 @@
           <a:p>
             <a:fld id="{984B7D2A-0DF8-424B-9572-B79AEBB2D9DC}" type="datetimeFigureOut">
               <a:rPr lang="en-US" noProof="0" smtClean="0"/>
-              <a:t>11/16/2024</a:t>
+              <a:t>11/19/2024</a:t>
             </a:fld>
             <a:endParaRPr lang="en-US" noProof="0" dirty="0"/>
           </a:p>
@@ -12468,7 +12954,7 @@
           <a:p>
             <a:fld id="{984B7D2A-0DF8-424B-9572-B79AEBB2D9DC}" type="datetimeFigureOut">
               <a:rPr lang="en-US" noProof="0" smtClean="0"/>
-              <a:t>11/16/2024</a:t>
+              <a:t>11/19/2024</a:t>
             </a:fld>
             <a:endParaRPr lang="en-US" noProof="0" dirty="0"/>
           </a:p>
@@ -13096,7 +13582,7 @@
           <a:p>
             <a:fld id="{984B7D2A-0DF8-424B-9572-B79AEBB2D9DC}" type="datetimeFigureOut">
               <a:rPr lang="en-US" noProof="0" smtClean="0"/>
-              <a:t>11/16/2024</a:t>
+              <a:t>11/19/2024</a:t>
             </a:fld>
             <a:endParaRPr lang="en-US" noProof="0" dirty="0"/>
           </a:p>
@@ -13551,7 +14037,7 @@
           <a:p>
             <a:fld id="{984B7D2A-0DF8-424B-9572-B79AEBB2D9DC}" type="datetimeFigureOut">
               <a:rPr lang="en-US" noProof="0" smtClean="0"/>
-              <a:t>11/16/2024</a:t>
+              <a:t>11/19/2024</a:t>
             </a:fld>
             <a:endParaRPr lang="en-US" noProof="0" dirty="0"/>
           </a:p>
@@ -13952,7 +14438,7 @@
           <a:p>
             <a:fld id="{984B7D2A-0DF8-424B-9572-B79AEBB2D9DC}" type="datetimeFigureOut">
               <a:rPr lang="en-US" noProof="0" smtClean="0"/>
-              <a:t>11/16/2024</a:t>
+              <a:t>11/19/2024</a:t>
             </a:fld>
             <a:endParaRPr lang="en-US" noProof="0" dirty="0"/>
           </a:p>
@@ -14244,7 +14730,7 @@
           <a:p>
             <a:fld id="{984B7D2A-0DF8-424B-9572-B79AEBB2D9DC}" type="datetimeFigureOut">
               <a:rPr lang="en-US" noProof="0" smtClean="0"/>
-              <a:t>11/16/2024</a:t>
+              <a:t>11/19/2024</a:t>
             </a:fld>
             <a:endParaRPr lang="en-US" noProof="0" dirty="0"/>
           </a:p>
@@ -15341,6 +15827,2562 @@
 </p:sld>
 </file>
 
+<file path=ppt/slides/slide11.xml><?xml version="1.0" encoding="utf-8"?>
+<p:sld xmlns:a="http://schemas.openxmlformats.org/drawingml/2006/main" xmlns:r="http://schemas.openxmlformats.org/officeDocument/2006/relationships" xmlns:p="http://schemas.openxmlformats.org/presentationml/2006/main">
+  <p:cSld>
+    <p:spTree>
+      <p:nvGrpSpPr>
+        <p:cNvPr id="1" name="">
+          <a:extLst>
+            <a:ext uri="{FF2B5EF4-FFF2-40B4-BE49-F238E27FC236}">
+              <a16:creationId xmlns:a16="http://schemas.microsoft.com/office/drawing/2014/main" id="{1046758B-508B-FA81-4356-A1AD81D25132}"/>
+            </a:ext>
+          </a:extLst>
+        </p:cNvPr>
+        <p:cNvGrpSpPr/>
+        <p:nvPr/>
+      </p:nvGrpSpPr>
+      <p:grpSpPr>
+        <a:xfrm>
+          <a:off x="0" y="0"/>
+          <a:ext cx="0" cy="0"/>
+          <a:chOff x="0" y="0"/>
+          <a:chExt cx="0" cy="0"/>
+        </a:xfrm>
+      </p:grpSpPr>
+      <p:sp>
+        <p:nvSpPr>
+          <p:cNvPr id="2" name="Title 1">
+            <a:extLst>
+              <a:ext uri="{FF2B5EF4-FFF2-40B4-BE49-F238E27FC236}">
+                <a16:creationId xmlns:a16="http://schemas.microsoft.com/office/drawing/2014/main" id="{16F22247-7F36-27F3-1586-3CB4E7CC59BE}"/>
+              </a:ext>
+            </a:extLst>
+          </p:cNvPr>
+          <p:cNvSpPr>
+            <a:spLocks noGrp="1"/>
+          </p:cNvSpPr>
+          <p:nvPr>
+            <p:ph type="title"/>
+          </p:nvPr>
+        </p:nvSpPr>
+        <p:spPr>
+          <a:xfrm>
+            <a:off x="248652" y="240632"/>
+            <a:ext cx="11726779" cy="457199"/>
+          </a:xfrm>
+        </p:spPr>
+        <p:txBody>
+          <a:bodyPr>
+            <a:noAutofit/>
+          </a:bodyPr>
+          <a:lstStyle/>
+          <a:p>
+            <a:r>
+              <a:rPr lang="en-GB" sz="2400" b="1" dirty="0">
+                <a:latin typeface="Helvetica" panose="020B0604020202020204" pitchFamily="34" charset="0"/>
+                <a:cs typeface="Helvetica" panose="020B0604020202020204" pitchFamily="34" charset="0"/>
+              </a:rPr>
+              <a:t>Customer Segmentation</a:t>
+            </a:r>
+          </a:p>
+        </p:txBody>
+      </p:sp>
+      <p:sp>
+        <p:nvSpPr>
+          <p:cNvPr id="6" name="Content Placeholder 5">
+            <a:extLst>
+              <a:ext uri="{FF2B5EF4-FFF2-40B4-BE49-F238E27FC236}">
+                <a16:creationId xmlns:a16="http://schemas.microsoft.com/office/drawing/2014/main" id="{CEBAFEFD-02CE-DD8B-822E-35E56BA0F27E}"/>
+              </a:ext>
+            </a:extLst>
+          </p:cNvPr>
+          <p:cNvSpPr>
+            <a:spLocks noGrp="1"/>
+          </p:cNvSpPr>
+          <p:nvPr>
+            <p:ph idx="1"/>
+          </p:nvPr>
+        </p:nvSpPr>
+        <p:spPr>
+          <a:xfrm>
+            <a:off x="248652" y="898359"/>
+            <a:ext cx="6416112" cy="5959642"/>
+          </a:xfrm>
+        </p:spPr>
+        <p:txBody>
+          <a:bodyPr>
+            <a:normAutofit/>
+          </a:bodyPr>
+          <a:lstStyle/>
+          <a:p>
+            <a:pPr marL="0" indent="0">
+              <a:buNone/>
+            </a:pPr>
+            <a:r>
+              <a:rPr lang="en-GB" i="1" dirty="0"/>
+              <a:t>Customer segmentation is a technique used to divide customers into distinct groups based on their behaviour, demographics, preferences, and other characteristics.</a:t>
+            </a:r>
+          </a:p>
+          <a:p>
+            <a:pPr marL="0" indent="0">
+              <a:buNone/>
+            </a:pPr>
+            <a:endParaRPr lang="en-GB" i="1" dirty="0"/>
+          </a:p>
+          <a:p>
+            <a:pPr marL="0" indent="0">
+              <a:buNone/>
+            </a:pPr>
+            <a:r>
+              <a:rPr lang="en-GB" b="1" dirty="0"/>
+              <a:t>Objectives</a:t>
+            </a:r>
+            <a:r>
+              <a:rPr lang="en-GB" dirty="0"/>
+              <a:t>: The objectives of customer segmentation are to:</a:t>
+            </a:r>
+          </a:p>
+          <a:p>
+            <a:r>
+              <a:rPr lang="en-GB" dirty="0"/>
+              <a:t>Identify high-value customers from a large customer base</a:t>
+            </a:r>
+          </a:p>
+          <a:p>
+            <a:r>
+              <a:rPr lang="en-GB" dirty="0"/>
+              <a:t>Understand customer behaviour and preferences</a:t>
+            </a:r>
+          </a:p>
+          <a:p>
+            <a:r>
+              <a:rPr lang="en-GB" dirty="0"/>
+              <a:t>Develop targeted marketing campaigns</a:t>
+            </a:r>
+          </a:p>
+          <a:p>
+            <a:r>
+              <a:rPr lang="en-GB" dirty="0"/>
+              <a:t>Improve customer satisfaction and loyalty</a:t>
+            </a:r>
+          </a:p>
+          <a:p>
+            <a:pPr marL="457200" lvl="1" indent="0">
+              <a:buNone/>
+            </a:pPr>
+            <a:endParaRPr lang="en-GB" dirty="0"/>
+          </a:p>
+          <a:p>
+            <a:pPr marL="0" indent="0">
+              <a:buNone/>
+            </a:pPr>
+            <a:r>
+              <a:rPr lang="en-GB" b="1" dirty="0"/>
+              <a:t>Case studies</a:t>
+            </a:r>
+            <a:r>
+              <a:rPr lang="en-GB" dirty="0"/>
+              <a:t>:</a:t>
+            </a:r>
+          </a:p>
+          <a:p>
+            <a:pPr marL="457200" lvl="1" indent="0">
+              <a:buNone/>
+            </a:pPr>
+            <a:r>
+              <a:rPr lang="en-GB" dirty="0"/>
+              <a:t>A telecom company used customer segmentation to identify customers who were likely to churn and developed targeted retention campaigns, resulting in a 30% reduction in churn.</a:t>
+            </a:r>
+          </a:p>
+        </p:txBody>
+      </p:sp>
+      <p:pic>
+        <p:nvPicPr>
+          <p:cNvPr id="3" name="Picture 2" descr="5 Customer Segmentation Analysis Methods For Business Growth ...">
+            <a:extLst>
+              <a:ext uri="{FF2B5EF4-FFF2-40B4-BE49-F238E27FC236}">
+                <a16:creationId xmlns:a16="http://schemas.microsoft.com/office/drawing/2014/main" id="{228B4AA4-DE12-24FB-5E4C-B2F6013A99EA}"/>
+              </a:ext>
+            </a:extLst>
+          </p:cNvPr>
+          <p:cNvPicPr>
+            <a:picLocks noChangeAspect="1" noChangeArrowheads="1"/>
+          </p:cNvPicPr>
+          <p:nvPr/>
+        </p:nvPicPr>
+        <p:blipFill rotWithShape="1">
+          <a:blip r:embed="rId2">
+            <a:extLst>
+              <a:ext uri="{28A0092B-C50C-407E-A947-70E740481C1C}">
+                <a14:useLocalDpi xmlns:a14="http://schemas.microsoft.com/office/drawing/2010/main" val="0"/>
+              </a:ext>
+            </a:extLst>
+          </a:blip>
+          <a:srcRect l="11906"/>
+          <a:stretch/>
+        </p:blipFill>
+        <p:spPr bwMode="auto">
+          <a:xfrm>
+            <a:off x="6664764" y="898359"/>
+            <a:ext cx="5527236" cy="3529264"/>
+          </a:xfrm>
+          <a:prstGeom prst="rect">
+            <a:avLst/>
+          </a:prstGeom>
+          <a:noFill/>
+          <a:extLst>
+            <a:ext uri="{909E8E84-426E-40DD-AFC4-6F175D3DCCD1}">
+              <a14:hiddenFill xmlns:a14="http://schemas.microsoft.com/office/drawing/2010/main">
+                <a:solidFill>
+                  <a:srgbClr val="FFFFFF"/>
+                </a:solidFill>
+              </a14:hiddenFill>
+            </a:ext>
+          </a:extLst>
+        </p:spPr>
+      </p:pic>
+    </p:spTree>
+    <p:extLst>
+      <p:ext uri="{BB962C8B-B14F-4D97-AF65-F5344CB8AC3E}">
+        <p14:creationId xmlns:p14="http://schemas.microsoft.com/office/powerpoint/2010/main" val="1088662929"/>
+      </p:ext>
+    </p:extLst>
+  </p:cSld>
+  <p:clrMapOvr>
+    <a:masterClrMapping/>
+  </p:clrMapOvr>
+</p:sld>
+</file>
+
+<file path=ppt/slides/slide12.xml><?xml version="1.0" encoding="utf-8"?>
+<p:sld xmlns:a="http://schemas.openxmlformats.org/drawingml/2006/main" xmlns:r="http://schemas.openxmlformats.org/officeDocument/2006/relationships" xmlns:p="http://schemas.openxmlformats.org/presentationml/2006/main">
+  <p:cSld>
+    <p:spTree>
+      <p:nvGrpSpPr>
+        <p:cNvPr id="1" name="">
+          <a:extLst>
+            <a:ext uri="{FF2B5EF4-FFF2-40B4-BE49-F238E27FC236}">
+              <a16:creationId xmlns:a16="http://schemas.microsoft.com/office/drawing/2014/main" id="{F11E9B68-ED0C-A02F-3D1B-38A319DBBA73}"/>
+            </a:ext>
+          </a:extLst>
+        </p:cNvPr>
+        <p:cNvGrpSpPr/>
+        <p:nvPr/>
+      </p:nvGrpSpPr>
+      <p:grpSpPr>
+        <a:xfrm>
+          <a:off x="0" y="0"/>
+          <a:ext cx="0" cy="0"/>
+          <a:chOff x="0" y="0"/>
+          <a:chExt cx="0" cy="0"/>
+        </a:xfrm>
+      </p:grpSpPr>
+      <p:sp>
+        <p:nvSpPr>
+          <p:cNvPr id="2" name="Title 1">
+            <a:extLst>
+              <a:ext uri="{FF2B5EF4-FFF2-40B4-BE49-F238E27FC236}">
+                <a16:creationId xmlns:a16="http://schemas.microsoft.com/office/drawing/2014/main" id="{C545FA87-CD87-80A2-411B-ED84A781CB13}"/>
+              </a:ext>
+            </a:extLst>
+          </p:cNvPr>
+          <p:cNvSpPr>
+            <a:spLocks noGrp="1"/>
+          </p:cNvSpPr>
+          <p:nvPr>
+            <p:ph type="title"/>
+          </p:nvPr>
+        </p:nvSpPr>
+        <p:spPr>
+          <a:xfrm>
+            <a:off x="248652" y="240632"/>
+            <a:ext cx="11726779" cy="457199"/>
+          </a:xfrm>
+        </p:spPr>
+        <p:txBody>
+          <a:bodyPr>
+            <a:noAutofit/>
+          </a:bodyPr>
+          <a:lstStyle/>
+          <a:p>
+            <a:r>
+              <a:rPr lang="en-GB" sz="2400" b="1" dirty="0">
+                <a:latin typeface="Helvetica" panose="020B0604020202020204" pitchFamily="34" charset="0"/>
+                <a:cs typeface="Helvetica" panose="020B0604020202020204" pitchFamily="34" charset="0"/>
+              </a:rPr>
+              <a:t>Customer Segmentation</a:t>
+            </a:r>
+          </a:p>
+        </p:txBody>
+      </p:sp>
+      <p:sp>
+        <p:nvSpPr>
+          <p:cNvPr id="6" name="Content Placeholder 5">
+            <a:extLst>
+              <a:ext uri="{FF2B5EF4-FFF2-40B4-BE49-F238E27FC236}">
+                <a16:creationId xmlns:a16="http://schemas.microsoft.com/office/drawing/2014/main" id="{7C4CC8E5-7FE3-2AB1-45D0-19BFA4EBAE7D}"/>
+              </a:ext>
+            </a:extLst>
+          </p:cNvPr>
+          <p:cNvSpPr>
+            <a:spLocks noGrp="1"/>
+          </p:cNvSpPr>
+          <p:nvPr>
+            <p:ph idx="1"/>
+          </p:nvPr>
+        </p:nvSpPr>
+        <p:spPr>
+          <a:xfrm>
+            <a:off x="248652" y="898359"/>
+            <a:ext cx="6416112" cy="5959642"/>
+          </a:xfrm>
+        </p:spPr>
+        <p:txBody>
+          <a:bodyPr>
+            <a:normAutofit lnSpcReduction="10000"/>
+          </a:bodyPr>
+          <a:lstStyle/>
+          <a:p>
+            <a:pPr marL="0" indent="0">
+              <a:buNone/>
+            </a:pPr>
+            <a:r>
+              <a:rPr lang="en-GB" b="1" dirty="0"/>
+              <a:t>Required datasets</a:t>
+            </a:r>
+            <a:r>
+              <a:rPr lang="en-GB" dirty="0"/>
+              <a:t>:</a:t>
+            </a:r>
+          </a:p>
+          <a:p>
+            <a:r>
+              <a:rPr lang="en-GB" dirty="0"/>
+              <a:t>Customer demographic data (e.g. age, gender, location)</a:t>
+            </a:r>
+          </a:p>
+          <a:p>
+            <a:r>
+              <a:rPr lang="en-GB" dirty="0"/>
+              <a:t>Customer behaviour data (e.g. purchase history, browsing history)</a:t>
+            </a:r>
+          </a:p>
+          <a:p>
+            <a:r>
+              <a:rPr lang="en-GB" dirty="0"/>
+              <a:t>Customer preference data (e.g. product preferences, communication preferences)</a:t>
+            </a:r>
+          </a:p>
+          <a:p>
+            <a:pPr marL="0" indent="0">
+              <a:buNone/>
+            </a:pPr>
+            <a:endParaRPr lang="en-GB" dirty="0"/>
+          </a:p>
+          <a:p>
+            <a:pPr marL="0" indent="0">
+              <a:buNone/>
+            </a:pPr>
+            <a:r>
+              <a:rPr lang="en-GB" b="1" dirty="0"/>
+              <a:t>Steps</a:t>
+            </a:r>
+            <a:r>
+              <a:rPr lang="en-GB" dirty="0"/>
+              <a:t>:</a:t>
+            </a:r>
+          </a:p>
+          <a:p>
+            <a:pPr marL="342900" indent="-342900">
+              <a:buFont typeface="+mj-lt"/>
+              <a:buAutoNum type="arabicPeriod"/>
+            </a:pPr>
+            <a:r>
+              <a:rPr lang="en-GB" dirty="0"/>
+              <a:t>Collect and clean the data</a:t>
+            </a:r>
+          </a:p>
+          <a:p>
+            <a:pPr marL="342900" indent="-342900">
+              <a:buFont typeface="+mj-lt"/>
+              <a:buAutoNum type="arabicPeriod"/>
+            </a:pPr>
+            <a:r>
+              <a:rPr lang="en-GB" dirty="0"/>
+              <a:t>Identify the variables to use for segmentation (e.g. demographic, </a:t>
+            </a:r>
+            <a:r>
+              <a:rPr lang="en-GB" dirty="0" err="1"/>
+              <a:t>behavioral</a:t>
+            </a:r>
+            <a:r>
+              <a:rPr lang="en-GB" dirty="0"/>
+              <a:t>, preference)</a:t>
+            </a:r>
+          </a:p>
+          <a:p>
+            <a:pPr marL="342900" indent="-342900">
+              <a:buFont typeface="+mj-lt"/>
+              <a:buAutoNum type="arabicPeriod"/>
+            </a:pPr>
+            <a:r>
+              <a:rPr lang="en-GB" dirty="0"/>
+              <a:t>Choose a clustering algorithm (e.g. K-Means, Hierarchical Clustering)</a:t>
+            </a:r>
+          </a:p>
+          <a:p>
+            <a:pPr marL="342900" indent="-342900">
+              <a:buFont typeface="+mj-lt"/>
+              <a:buAutoNum type="arabicPeriod"/>
+            </a:pPr>
+            <a:r>
+              <a:rPr lang="en-GB" dirty="0"/>
+              <a:t>Apply the clustering algorithm to the data</a:t>
+            </a:r>
+          </a:p>
+          <a:p>
+            <a:pPr marL="342900" indent="-342900">
+              <a:buFont typeface="+mj-lt"/>
+              <a:buAutoNum type="arabicPeriod"/>
+            </a:pPr>
+            <a:r>
+              <a:rPr lang="en-GB" dirty="0"/>
+              <a:t>Evaluate the clusters and identify the most valuable segments</a:t>
+            </a:r>
+          </a:p>
+          <a:p>
+            <a:pPr marL="342900" indent="-342900">
+              <a:buFont typeface="+mj-lt"/>
+              <a:buAutoNum type="arabicPeriod"/>
+            </a:pPr>
+            <a:r>
+              <a:rPr lang="en-GB" dirty="0"/>
+              <a:t>Develop targeted marketing campaigns for each segment</a:t>
+            </a:r>
+          </a:p>
+        </p:txBody>
+      </p:sp>
+      <p:pic>
+        <p:nvPicPr>
+          <p:cNvPr id="8" name="Picture 7">
+            <a:extLst>
+              <a:ext uri="{FF2B5EF4-FFF2-40B4-BE49-F238E27FC236}">
+                <a16:creationId xmlns:a16="http://schemas.microsoft.com/office/drawing/2014/main" id="{DF968B54-B55C-E835-2921-8C29E2236981}"/>
+              </a:ext>
+            </a:extLst>
+          </p:cNvPr>
+          <p:cNvPicPr>
+            <a:picLocks noChangeAspect="1"/>
+          </p:cNvPicPr>
+          <p:nvPr/>
+        </p:nvPicPr>
+        <p:blipFill>
+          <a:blip r:embed="rId2"/>
+          <a:stretch>
+            <a:fillRect/>
+          </a:stretch>
+        </p:blipFill>
+        <p:spPr>
+          <a:xfrm>
+            <a:off x="6627068" y="898359"/>
+            <a:ext cx="5564932" cy="3813009"/>
+          </a:xfrm>
+          <a:prstGeom prst="rect">
+            <a:avLst/>
+          </a:prstGeom>
+        </p:spPr>
+      </p:pic>
+    </p:spTree>
+    <p:extLst>
+      <p:ext uri="{BB962C8B-B14F-4D97-AF65-F5344CB8AC3E}">
+        <p14:creationId xmlns:p14="http://schemas.microsoft.com/office/powerpoint/2010/main" val="1541829334"/>
+      </p:ext>
+    </p:extLst>
+  </p:cSld>
+  <p:clrMapOvr>
+    <a:masterClrMapping/>
+  </p:clrMapOvr>
+</p:sld>
+</file>
+
+<file path=ppt/slides/slide13.xml><?xml version="1.0" encoding="utf-8"?>
+<p:sld xmlns:a="http://schemas.openxmlformats.org/drawingml/2006/main" xmlns:r="http://schemas.openxmlformats.org/officeDocument/2006/relationships" xmlns:p="http://schemas.openxmlformats.org/presentationml/2006/main">
+  <p:cSld>
+    <p:spTree>
+      <p:nvGrpSpPr>
+        <p:cNvPr id="1" name="">
+          <a:extLst>
+            <a:ext uri="{FF2B5EF4-FFF2-40B4-BE49-F238E27FC236}">
+              <a16:creationId xmlns:a16="http://schemas.microsoft.com/office/drawing/2014/main" id="{56F9668A-B577-CCC5-F961-14C23490B658}"/>
+            </a:ext>
+          </a:extLst>
+        </p:cNvPr>
+        <p:cNvGrpSpPr/>
+        <p:nvPr/>
+      </p:nvGrpSpPr>
+      <p:grpSpPr>
+        <a:xfrm>
+          <a:off x="0" y="0"/>
+          <a:ext cx="0" cy="0"/>
+          <a:chOff x="0" y="0"/>
+          <a:chExt cx="0" cy="0"/>
+        </a:xfrm>
+      </p:grpSpPr>
+      <p:sp>
+        <p:nvSpPr>
+          <p:cNvPr id="2" name="Title 1">
+            <a:extLst>
+              <a:ext uri="{FF2B5EF4-FFF2-40B4-BE49-F238E27FC236}">
+                <a16:creationId xmlns:a16="http://schemas.microsoft.com/office/drawing/2014/main" id="{182A635E-DDC5-F29A-E80B-BFA27EA4D024}"/>
+              </a:ext>
+            </a:extLst>
+          </p:cNvPr>
+          <p:cNvSpPr>
+            <a:spLocks noGrp="1"/>
+          </p:cNvSpPr>
+          <p:nvPr>
+            <p:ph type="title"/>
+          </p:nvPr>
+        </p:nvSpPr>
+        <p:spPr>
+          <a:xfrm>
+            <a:off x="248652" y="240632"/>
+            <a:ext cx="11726779" cy="457199"/>
+          </a:xfrm>
+        </p:spPr>
+        <p:txBody>
+          <a:bodyPr>
+            <a:noAutofit/>
+          </a:bodyPr>
+          <a:lstStyle/>
+          <a:p>
+            <a:r>
+              <a:rPr lang="en-GB" sz="2400" b="1" dirty="0">
+                <a:latin typeface="Helvetica" panose="020B0604020202020204" pitchFamily="34" charset="0"/>
+                <a:cs typeface="Helvetica" panose="020B0604020202020204" pitchFamily="34" charset="0"/>
+              </a:rPr>
+              <a:t>Customer Segmentation</a:t>
+            </a:r>
+          </a:p>
+        </p:txBody>
+      </p:sp>
+      <p:sp>
+        <p:nvSpPr>
+          <p:cNvPr id="7" name="Content Placeholder 5">
+            <a:extLst>
+              <a:ext uri="{FF2B5EF4-FFF2-40B4-BE49-F238E27FC236}">
+                <a16:creationId xmlns:a16="http://schemas.microsoft.com/office/drawing/2014/main" id="{B778B476-6B74-057D-546D-32FAE315B6A8}"/>
+              </a:ext>
+            </a:extLst>
+          </p:cNvPr>
+          <p:cNvSpPr txBox="1">
+            <a:spLocks/>
+          </p:cNvSpPr>
+          <p:nvPr/>
+        </p:nvSpPr>
+        <p:spPr bwMode="white">
+          <a:xfrm>
+            <a:off x="334647" y="1155031"/>
+            <a:ext cx="11504427" cy="5462337"/>
+          </a:xfrm>
+          <a:prstGeom prst="rect">
+            <a:avLst/>
+          </a:prstGeom>
+        </p:spPr>
+        <p:txBody>
+          <a:bodyPr vert="horz" lIns="91440" tIns="45720" rIns="91440" bIns="45720" rtlCol="0" anchor="t" anchorCtr="0">
+            <a:normAutofit/>
+          </a:bodyPr>
+          <a:lstStyle>
+            <a:lvl1pPr marL="285750" indent="-285750" algn="l" defTabSz="457200" rtl="0" eaLnBrk="1" latinLnBrk="0" hangingPunct="1">
+              <a:spcBef>
+                <a:spcPts val="0"/>
+              </a:spcBef>
+              <a:spcAft>
+                <a:spcPts val="1000"/>
+              </a:spcAft>
+              <a:buClr>
+                <a:schemeClr val="tx1"/>
+              </a:buClr>
+              <a:buSzPct val="100000"/>
+              <a:buFont typeface="Arial"/>
+              <a:buChar char="•"/>
+              <a:defRPr sz="1800" kern="1200" cap="none">
+                <a:solidFill>
+                  <a:schemeClr val="tx1"/>
+                </a:solidFill>
+                <a:effectLst/>
+                <a:latin typeface="+mn-lt"/>
+                <a:ea typeface="+mn-ea"/>
+                <a:cs typeface="+mn-cs"/>
+              </a:defRPr>
+            </a:lvl1pPr>
+            <a:lvl2pPr marL="742950" indent="-285750" algn="l" defTabSz="457200" rtl="0" eaLnBrk="1" latinLnBrk="0" hangingPunct="1">
+              <a:spcBef>
+                <a:spcPts val="0"/>
+              </a:spcBef>
+              <a:spcAft>
+                <a:spcPts val="1000"/>
+              </a:spcAft>
+              <a:buClr>
+                <a:schemeClr val="tx1"/>
+              </a:buClr>
+              <a:buSzPct val="100000"/>
+              <a:buFont typeface="Arial"/>
+              <a:buChar char="•"/>
+              <a:defRPr sz="1600" kern="1200" cap="none">
+                <a:solidFill>
+                  <a:schemeClr val="tx1"/>
+                </a:solidFill>
+                <a:effectLst/>
+                <a:latin typeface="+mn-lt"/>
+                <a:ea typeface="+mn-ea"/>
+                <a:cs typeface="+mn-cs"/>
+              </a:defRPr>
+            </a:lvl2pPr>
+            <a:lvl3pPr marL="1200150" indent="-285750" algn="l" defTabSz="457200" rtl="0" eaLnBrk="1" latinLnBrk="0" hangingPunct="1">
+              <a:spcBef>
+                <a:spcPts val="0"/>
+              </a:spcBef>
+              <a:spcAft>
+                <a:spcPts val="1000"/>
+              </a:spcAft>
+              <a:buClr>
+                <a:schemeClr val="tx1"/>
+              </a:buClr>
+              <a:buSzPct val="100000"/>
+              <a:buFont typeface="Arial"/>
+              <a:buChar char="•"/>
+              <a:defRPr sz="1400" kern="1200" cap="none">
+                <a:solidFill>
+                  <a:schemeClr val="tx1"/>
+                </a:solidFill>
+                <a:effectLst/>
+                <a:latin typeface="+mn-lt"/>
+                <a:ea typeface="+mn-ea"/>
+                <a:cs typeface="+mn-cs"/>
+              </a:defRPr>
+            </a:lvl3pPr>
+            <a:lvl4pPr marL="1543050" indent="-171450" algn="l" defTabSz="457200" rtl="0" eaLnBrk="1" latinLnBrk="0" hangingPunct="1">
+              <a:spcBef>
+                <a:spcPts val="0"/>
+              </a:spcBef>
+              <a:spcAft>
+                <a:spcPts val="1000"/>
+              </a:spcAft>
+              <a:buClr>
+                <a:schemeClr val="tx1"/>
+              </a:buClr>
+              <a:buSzPct val="100000"/>
+              <a:buFont typeface="Arial"/>
+              <a:buChar char="•"/>
+              <a:defRPr sz="1200" kern="1200" cap="none">
+                <a:solidFill>
+                  <a:schemeClr val="tx1"/>
+                </a:solidFill>
+                <a:effectLst/>
+                <a:latin typeface="+mn-lt"/>
+                <a:ea typeface="+mn-ea"/>
+                <a:cs typeface="+mn-cs"/>
+              </a:defRPr>
+            </a:lvl4pPr>
+            <a:lvl5pPr marL="2000250" indent="-171450" algn="l" defTabSz="457200" rtl="0" eaLnBrk="1" latinLnBrk="0" hangingPunct="1">
+              <a:spcBef>
+                <a:spcPts val="0"/>
+              </a:spcBef>
+              <a:spcAft>
+                <a:spcPts val="1000"/>
+              </a:spcAft>
+              <a:buClr>
+                <a:schemeClr val="tx1"/>
+              </a:buClr>
+              <a:buSzPct val="100000"/>
+              <a:buFont typeface="Arial"/>
+              <a:buChar char="•"/>
+              <a:defRPr sz="1200" kern="1200" cap="none">
+                <a:solidFill>
+                  <a:schemeClr val="tx1"/>
+                </a:solidFill>
+                <a:effectLst/>
+                <a:latin typeface="+mn-lt"/>
+                <a:ea typeface="+mn-ea"/>
+                <a:cs typeface="+mn-cs"/>
+              </a:defRPr>
+            </a:lvl5pPr>
+            <a:lvl6pPr marL="2514600" indent="-228600" algn="l" defTabSz="457200" rtl="0" eaLnBrk="1" latinLnBrk="0" hangingPunct="1">
+              <a:spcBef>
+                <a:spcPts val="0"/>
+              </a:spcBef>
+              <a:spcAft>
+                <a:spcPts val="1000"/>
+              </a:spcAft>
+              <a:buClr>
+                <a:schemeClr val="tx1"/>
+              </a:buClr>
+              <a:buSzPct val="100000"/>
+              <a:buFont typeface="Arial"/>
+              <a:buChar char="•"/>
+              <a:defRPr sz="1200" kern="1200" cap="none">
+                <a:solidFill>
+                  <a:schemeClr val="tx1"/>
+                </a:solidFill>
+                <a:effectLst/>
+                <a:latin typeface="+mn-lt"/>
+                <a:ea typeface="+mn-ea"/>
+                <a:cs typeface="+mn-cs"/>
+              </a:defRPr>
+            </a:lvl6pPr>
+            <a:lvl7pPr marL="2971800" indent="-228600" algn="l" defTabSz="457200" rtl="0" eaLnBrk="1" latinLnBrk="0" hangingPunct="1">
+              <a:spcBef>
+                <a:spcPts val="0"/>
+              </a:spcBef>
+              <a:spcAft>
+                <a:spcPts val="1000"/>
+              </a:spcAft>
+              <a:buClr>
+                <a:schemeClr val="tx1"/>
+              </a:buClr>
+              <a:buSzPct val="100000"/>
+              <a:buFont typeface="Arial"/>
+              <a:buChar char="•"/>
+              <a:defRPr sz="1200" kern="1200" cap="none">
+                <a:solidFill>
+                  <a:schemeClr val="tx1"/>
+                </a:solidFill>
+                <a:effectLst/>
+                <a:latin typeface="+mn-lt"/>
+                <a:ea typeface="+mn-ea"/>
+                <a:cs typeface="+mn-cs"/>
+              </a:defRPr>
+            </a:lvl7pPr>
+            <a:lvl8pPr marL="3429000" indent="-228600" algn="l" defTabSz="457200" rtl="0" eaLnBrk="1" latinLnBrk="0" hangingPunct="1">
+              <a:spcBef>
+                <a:spcPts val="0"/>
+              </a:spcBef>
+              <a:spcAft>
+                <a:spcPts val="1000"/>
+              </a:spcAft>
+              <a:buClr>
+                <a:schemeClr val="tx1"/>
+              </a:buClr>
+              <a:buSzPct val="100000"/>
+              <a:buFont typeface="Arial"/>
+              <a:buChar char="•"/>
+              <a:defRPr sz="1200" kern="1200" cap="none">
+                <a:solidFill>
+                  <a:schemeClr val="tx1"/>
+                </a:solidFill>
+                <a:effectLst/>
+                <a:latin typeface="+mn-lt"/>
+                <a:ea typeface="+mn-ea"/>
+                <a:cs typeface="+mn-cs"/>
+              </a:defRPr>
+            </a:lvl8pPr>
+            <a:lvl9pPr marL="3886200" indent="-228600" algn="l" defTabSz="457200" rtl="0" eaLnBrk="1" latinLnBrk="0" hangingPunct="1">
+              <a:spcBef>
+                <a:spcPts val="0"/>
+              </a:spcBef>
+              <a:spcAft>
+                <a:spcPts val="1000"/>
+              </a:spcAft>
+              <a:buClr>
+                <a:schemeClr val="tx1"/>
+              </a:buClr>
+              <a:buSzPct val="100000"/>
+              <a:buFont typeface="Arial"/>
+              <a:buChar char="•"/>
+              <a:defRPr sz="1200" kern="1200" cap="none">
+                <a:solidFill>
+                  <a:schemeClr val="tx1"/>
+                </a:solidFill>
+                <a:effectLst/>
+                <a:latin typeface="+mn-lt"/>
+                <a:ea typeface="+mn-ea"/>
+                <a:cs typeface="+mn-cs"/>
+              </a:defRPr>
+            </a:lvl9pPr>
+          </a:lstStyle>
+          <a:p>
+            <a:pPr marL="0" indent="0" algn="ctr">
+              <a:buFont typeface="Arial"/>
+              <a:buNone/>
+            </a:pPr>
+            <a:endParaRPr lang="en-GB" sz="2800" dirty="0"/>
+          </a:p>
+          <a:p>
+            <a:pPr marL="0" indent="0" algn="ctr">
+              <a:buFont typeface="Arial"/>
+              <a:buNone/>
+            </a:pPr>
+            <a:endParaRPr lang="en-GB" sz="2800" dirty="0"/>
+          </a:p>
+          <a:p>
+            <a:pPr marL="0" indent="0" algn="ctr">
+              <a:buFont typeface="Arial"/>
+              <a:buNone/>
+            </a:pPr>
+            <a:endParaRPr lang="en-GB" sz="2800" dirty="0"/>
+          </a:p>
+          <a:p>
+            <a:pPr marL="0" indent="0" algn="ctr">
+              <a:buFont typeface="Arial"/>
+              <a:buNone/>
+            </a:pPr>
+            <a:endParaRPr lang="en-GB" sz="2800" dirty="0"/>
+          </a:p>
+          <a:p>
+            <a:pPr marL="0" indent="0" algn="ctr">
+              <a:buFont typeface="Arial"/>
+              <a:buNone/>
+            </a:pPr>
+            <a:r>
+              <a:rPr lang="en-GB" sz="2800" dirty="0"/>
+              <a:t>LAB: Customer Segmentation</a:t>
+            </a:r>
+          </a:p>
+        </p:txBody>
+      </p:sp>
+    </p:spTree>
+    <p:extLst>
+      <p:ext uri="{BB962C8B-B14F-4D97-AF65-F5344CB8AC3E}">
+        <p14:creationId xmlns:p14="http://schemas.microsoft.com/office/powerpoint/2010/main" val="583165284"/>
+      </p:ext>
+    </p:extLst>
+  </p:cSld>
+  <p:clrMapOvr>
+    <a:masterClrMapping/>
+  </p:clrMapOvr>
+</p:sld>
+</file>
+
+<file path=ppt/slides/slide14.xml><?xml version="1.0" encoding="utf-8"?>
+<p:sld xmlns:a="http://schemas.openxmlformats.org/drawingml/2006/main" xmlns:r="http://schemas.openxmlformats.org/officeDocument/2006/relationships" xmlns:p="http://schemas.openxmlformats.org/presentationml/2006/main">
+  <p:cSld>
+    <p:spTree>
+      <p:nvGrpSpPr>
+        <p:cNvPr id="1" name="">
+          <a:extLst>
+            <a:ext uri="{FF2B5EF4-FFF2-40B4-BE49-F238E27FC236}">
+              <a16:creationId xmlns:a16="http://schemas.microsoft.com/office/drawing/2014/main" id="{B5E57CD3-BE50-92DE-601D-868D08F5A23C}"/>
+            </a:ext>
+          </a:extLst>
+        </p:cNvPr>
+        <p:cNvGrpSpPr/>
+        <p:nvPr/>
+      </p:nvGrpSpPr>
+      <p:grpSpPr>
+        <a:xfrm>
+          <a:off x="0" y="0"/>
+          <a:ext cx="0" cy="0"/>
+          <a:chOff x="0" y="0"/>
+          <a:chExt cx="0" cy="0"/>
+        </a:xfrm>
+      </p:grpSpPr>
+      <p:sp>
+        <p:nvSpPr>
+          <p:cNvPr id="2" name="Title 1">
+            <a:extLst>
+              <a:ext uri="{FF2B5EF4-FFF2-40B4-BE49-F238E27FC236}">
+                <a16:creationId xmlns:a16="http://schemas.microsoft.com/office/drawing/2014/main" id="{0DEEB00A-9EBA-F986-1BDD-17D8622D2F4A}"/>
+              </a:ext>
+            </a:extLst>
+          </p:cNvPr>
+          <p:cNvSpPr>
+            <a:spLocks noGrp="1"/>
+          </p:cNvSpPr>
+          <p:nvPr>
+            <p:ph type="title"/>
+          </p:nvPr>
+        </p:nvSpPr>
+        <p:spPr>
+          <a:xfrm>
+            <a:off x="248652" y="240632"/>
+            <a:ext cx="11726779" cy="457199"/>
+          </a:xfrm>
+        </p:spPr>
+        <p:txBody>
+          <a:bodyPr>
+            <a:noAutofit/>
+          </a:bodyPr>
+          <a:lstStyle/>
+          <a:p>
+            <a:r>
+              <a:rPr lang="en-GB" sz="2400" b="1" dirty="0">
+                <a:latin typeface="Helvetica" panose="020B0604020202020204" pitchFamily="34" charset="0"/>
+                <a:cs typeface="Helvetica" panose="020B0604020202020204" pitchFamily="34" charset="0"/>
+              </a:rPr>
+              <a:t>Propensity modelling</a:t>
+            </a:r>
+          </a:p>
+        </p:txBody>
+      </p:sp>
+      <p:sp>
+        <p:nvSpPr>
+          <p:cNvPr id="6" name="Content Placeholder 5">
+            <a:extLst>
+              <a:ext uri="{FF2B5EF4-FFF2-40B4-BE49-F238E27FC236}">
+                <a16:creationId xmlns:a16="http://schemas.microsoft.com/office/drawing/2014/main" id="{1F166BF5-A7D6-14F2-CDE3-7B845A37A7F6}"/>
+              </a:ext>
+            </a:extLst>
+          </p:cNvPr>
+          <p:cNvSpPr>
+            <a:spLocks noGrp="1"/>
+          </p:cNvSpPr>
+          <p:nvPr>
+            <p:ph idx="1"/>
+          </p:nvPr>
+        </p:nvSpPr>
+        <p:spPr>
+          <a:xfrm>
+            <a:off x="248652" y="898359"/>
+            <a:ext cx="6505074" cy="5959642"/>
+          </a:xfrm>
+        </p:spPr>
+        <p:txBody>
+          <a:bodyPr>
+            <a:normAutofit/>
+          </a:bodyPr>
+          <a:lstStyle/>
+          <a:p>
+            <a:pPr marL="0" indent="0">
+              <a:buNone/>
+            </a:pPr>
+            <a:r>
+              <a:rPr lang="en-GB" i="1" dirty="0"/>
+              <a:t>Propensity </a:t>
+            </a:r>
+            <a:r>
+              <a:rPr lang="en-GB" i="1" dirty="0" err="1"/>
+              <a:t>modeling</a:t>
+            </a:r>
+            <a:r>
+              <a:rPr lang="en-GB" i="1" dirty="0"/>
+              <a:t> is a technique used to predict the likelihood of a customer to perform a specific action (e.g. make a purchase, respond to an offer, customer lifetime value, propensity to churn).</a:t>
+            </a:r>
+          </a:p>
+          <a:p>
+            <a:pPr marL="0" indent="0">
+              <a:buNone/>
+            </a:pPr>
+            <a:endParaRPr lang="en-GB" i="1" dirty="0"/>
+          </a:p>
+          <a:p>
+            <a:pPr marL="0" indent="0">
+              <a:buNone/>
+            </a:pPr>
+            <a:r>
+              <a:rPr lang="en-GB" b="1" dirty="0"/>
+              <a:t>Objectives</a:t>
+            </a:r>
+            <a:r>
+              <a:rPr lang="en-GB" dirty="0"/>
+              <a:t>: The objectives of propensity model are to:</a:t>
+            </a:r>
+          </a:p>
+          <a:p>
+            <a:r>
+              <a:rPr lang="en-GB" dirty="0"/>
+              <a:t>Identify customers who are likely to perform a specific action</a:t>
+            </a:r>
+          </a:p>
+          <a:p>
+            <a:r>
+              <a:rPr lang="en-GB" dirty="0"/>
+              <a:t>Predict customer behaviour</a:t>
+            </a:r>
+          </a:p>
+          <a:p>
+            <a:r>
+              <a:rPr lang="en-GB" dirty="0"/>
+              <a:t>Develop targeted marketing campaigns</a:t>
+            </a:r>
+          </a:p>
+          <a:p>
+            <a:r>
+              <a:rPr lang="en-GB" dirty="0"/>
+              <a:t>Improve customer conversion rates</a:t>
+            </a:r>
+          </a:p>
+          <a:p>
+            <a:pPr marL="457200" lvl="1" indent="0">
+              <a:buNone/>
+            </a:pPr>
+            <a:endParaRPr lang="en-GB" dirty="0"/>
+          </a:p>
+          <a:p>
+            <a:pPr marL="0" indent="0">
+              <a:buNone/>
+            </a:pPr>
+            <a:r>
+              <a:rPr lang="en-GB" b="1" dirty="0"/>
+              <a:t>Case studies</a:t>
+            </a:r>
+            <a:r>
+              <a:rPr lang="en-GB" dirty="0"/>
+              <a:t>:</a:t>
+            </a:r>
+          </a:p>
+          <a:p>
+            <a:pPr marL="457200" lvl="1" indent="0">
+              <a:buNone/>
+            </a:pPr>
+            <a:r>
+              <a:rPr lang="en-GB" dirty="0"/>
+              <a:t>A financial services company used propensity </a:t>
+            </a:r>
+            <a:r>
+              <a:rPr lang="en-GB" dirty="0" err="1"/>
+              <a:t>modeling</a:t>
+            </a:r>
+            <a:r>
+              <a:rPr lang="en-GB" dirty="0"/>
+              <a:t> to predict which customers were likely to respond to an offer and developed targeted marketing campaigns, resulting in a 30% increase in response rates.</a:t>
+            </a:r>
+          </a:p>
+          <a:p>
+            <a:pPr marL="0" indent="0">
+              <a:buNone/>
+            </a:pPr>
+            <a:endParaRPr lang="en-GB" dirty="0"/>
+          </a:p>
+        </p:txBody>
+      </p:sp>
+      <p:pic>
+        <p:nvPicPr>
+          <p:cNvPr id="8" name="Picture 7">
+            <a:extLst>
+              <a:ext uri="{FF2B5EF4-FFF2-40B4-BE49-F238E27FC236}">
+                <a16:creationId xmlns:a16="http://schemas.microsoft.com/office/drawing/2014/main" id="{EC9A5A4E-6D7C-632D-B1F8-8A8D5C295D4A}"/>
+              </a:ext>
+            </a:extLst>
+          </p:cNvPr>
+          <p:cNvPicPr>
+            <a:picLocks noChangeAspect="1"/>
+          </p:cNvPicPr>
+          <p:nvPr/>
+        </p:nvPicPr>
+        <p:blipFill>
+          <a:blip r:embed="rId2"/>
+          <a:stretch>
+            <a:fillRect/>
+          </a:stretch>
+        </p:blipFill>
+        <p:spPr>
+          <a:xfrm>
+            <a:off x="7424080" y="898359"/>
+            <a:ext cx="4759900" cy="4517630"/>
+          </a:xfrm>
+          <a:prstGeom prst="rect">
+            <a:avLst/>
+          </a:prstGeom>
+        </p:spPr>
+      </p:pic>
+    </p:spTree>
+    <p:extLst>
+      <p:ext uri="{BB962C8B-B14F-4D97-AF65-F5344CB8AC3E}">
+        <p14:creationId xmlns:p14="http://schemas.microsoft.com/office/powerpoint/2010/main" val="1262947505"/>
+      </p:ext>
+    </p:extLst>
+  </p:cSld>
+  <p:clrMapOvr>
+    <a:masterClrMapping/>
+  </p:clrMapOvr>
+</p:sld>
+</file>
+
+<file path=ppt/slides/slide15.xml><?xml version="1.0" encoding="utf-8"?>
+<p:sld xmlns:a="http://schemas.openxmlformats.org/drawingml/2006/main" xmlns:r="http://schemas.openxmlformats.org/officeDocument/2006/relationships" xmlns:p="http://schemas.openxmlformats.org/presentationml/2006/main">
+  <p:cSld>
+    <p:spTree>
+      <p:nvGrpSpPr>
+        <p:cNvPr id="1" name="">
+          <a:extLst>
+            <a:ext uri="{FF2B5EF4-FFF2-40B4-BE49-F238E27FC236}">
+              <a16:creationId xmlns:a16="http://schemas.microsoft.com/office/drawing/2014/main" id="{7455F5F2-C5CC-DC0F-562F-05EBAF17A1F3}"/>
+            </a:ext>
+          </a:extLst>
+        </p:cNvPr>
+        <p:cNvGrpSpPr/>
+        <p:nvPr/>
+      </p:nvGrpSpPr>
+      <p:grpSpPr>
+        <a:xfrm>
+          <a:off x="0" y="0"/>
+          <a:ext cx="0" cy="0"/>
+          <a:chOff x="0" y="0"/>
+          <a:chExt cx="0" cy="0"/>
+        </a:xfrm>
+      </p:grpSpPr>
+      <p:sp>
+        <p:nvSpPr>
+          <p:cNvPr id="2" name="Title 1">
+            <a:extLst>
+              <a:ext uri="{FF2B5EF4-FFF2-40B4-BE49-F238E27FC236}">
+                <a16:creationId xmlns:a16="http://schemas.microsoft.com/office/drawing/2014/main" id="{D1F5F4B3-A6E3-6ACF-FFD8-793DE6A3861E}"/>
+              </a:ext>
+            </a:extLst>
+          </p:cNvPr>
+          <p:cNvSpPr>
+            <a:spLocks noGrp="1"/>
+          </p:cNvSpPr>
+          <p:nvPr>
+            <p:ph type="title"/>
+          </p:nvPr>
+        </p:nvSpPr>
+        <p:spPr>
+          <a:xfrm>
+            <a:off x="248652" y="240632"/>
+            <a:ext cx="11726779" cy="457199"/>
+          </a:xfrm>
+        </p:spPr>
+        <p:txBody>
+          <a:bodyPr>
+            <a:noAutofit/>
+          </a:bodyPr>
+          <a:lstStyle/>
+          <a:p>
+            <a:r>
+              <a:rPr lang="en-GB" sz="2400" b="1" dirty="0">
+                <a:latin typeface="Helvetica" panose="020B0604020202020204" pitchFamily="34" charset="0"/>
+                <a:cs typeface="Helvetica" panose="020B0604020202020204" pitchFamily="34" charset="0"/>
+              </a:rPr>
+              <a:t>Propensity modelling</a:t>
+            </a:r>
+          </a:p>
+        </p:txBody>
+      </p:sp>
+      <p:sp>
+        <p:nvSpPr>
+          <p:cNvPr id="6" name="Content Placeholder 5">
+            <a:extLst>
+              <a:ext uri="{FF2B5EF4-FFF2-40B4-BE49-F238E27FC236}">
+                <a16:creationId xmlns:a16="http://schemas.microsoft.com/office/drawing/2014/main" id="{C77F443A-686E-45F3-E4CE-91E089EDBD2A}"/>
+              </a:ext>
+            </a:extLst>
+          </p:cNvPr>
+          <p:cNvSpPr>
+            <a:spLocks noGrp="1"/>
+          </p:cNvSpPr>
+          <p:nvPr>
+            <p:ph idx="1"/>
+          </p:nvPr>
+        </p:nvSpPr>
+        <p:spPr>
+          <a:xfrm>
+            <a:off x="248652" y="898359"/>
+            <a:ext cx="5464114" cy="5959642"/>
+          </a:xfrm>
+        </p:spPr>
+        <p:txBody>
+          <a:bodyPr>
+            <a:normAutofit fontScale="85000" lnSpcReduction="10000"/>
+          </a:bodyPr>
+          <a:lstStyle/>
+          <a:p>
+            <a:pPr marL="0" indent="0">
+              <a:buNone/>
+            </a:pPr>
+            <a:r>
+              <a:rPr lang="en-GB" b="1" dirty="0"/>
+              <a:t>Required datasets</a:t>
+            </a:r>
+            <a:r>
+              <a:rPr lang="en-GB" dirty="0"/>
+              <a:t>:</a:t>
+            </a:r>
+          </a:p>
+          <a:p>
+            <a:r>
+              <a:rPr lang="en-GB" dirty="0"/>
+              <a:t>Customer demographic data (e.g. age, gender, location)</a:t>
+            </a:r>
+          </a:p>
+          <a:p>
+            <a:r>
+              <a:rPr lang="en-GB" dirty="0"/>
+              <a:t>Customer behaviour data (e.g. purchase history, browsing history)</a:t>
+            </a:r>
+          </a:p>
+          <a:p>
+            <a:r>
+              <a:rPr lang="en-GB" dirty="0"/>
+              <a:t>Customer preference data (e.g. product preferences, communication preferences)</a:t>
+            </a:r>
+          </a:p>
+          <a:p>
+            <a:r>
+              <a:rPr lang="en-GB" dirty="0"/>
+              <a:t>Historical data on customer actions (e.g. purchases, responses to offers)</a:t>
+            </a:r>
+          </a:p>
+          <a:p>
+            <a:pPr marL="0" indent="0">
+              <a:buNone/>
+            </a:pPr>
+            <a:endParaRPr lang="en-GB" dirty="0"/>
+          </a:p>
+          <a:p>
+            <a:pPr marL="0" indent="0">
+              <a:buNone/>
+            </a:pPr>
+            <a:r>
+              <a:rPr lang="en-GB" b="1" dirty="0"/>
+              <a:t>Steps</a:t>
+            </a:r>
+            <a:r>
+              <a:rPr lang="en-GB" dirty="0"/>
+              <a:t>:</a:t>
+            </a:r>
+          </a:p>
+          <a:p>
+            <a:pPr marL="342900" indent="-342900">
+              <a:buFont typeface="+mj-lt"/>
+              <a:buAutoNum type="arabicPeriod"/>
+            </a:pPr>
+            <a:r>
+              <a:rPr lang="en-GB" dirty="0"/>
+              <a:t>Collect and clean the data</a:t>
+            </a:r>
+          </a:p>
+          <a:p>
+            <a:pPr marL="342900" indent="-342900">
+              <a:buFont typeface="+mj-lt"/>
+              <a:buAutoNum type="arabicPeriod"/>
+            </a:pPr>
+            <a:r>
+              <a:rPr lang="en-GB" dirty="0"/>
+              <a:t>Identify the variables to use for segmentation (e.g. demographic, behavioural, preference)</a:t>
+            </a:r>
+          </a:p>
+          <a:p>
+            <a:pPr marL="342900" indent="-342900">
+              <a:buFont typeface="+mj-lt"/>
+              <a:buAutoNum type="arabicPeriod"/>
+            </a:pPr>
+            <a:r>
+              <a:rPr lang="en-GB" dirty="0"/>
+              <a:t>Choose a </a:t>
+            </a:r>
+            <a:r>
+              <a:rPr lang="en-GB" dirty="0" err="1"/>
+              <a:t>modeling</a:t>
+            </a:r>
+            <a:r>
+              <a:rPr lang="en-GB" dirty="0"/>
+              <a:t> algorithm (e.g. Logistic regression, Decision trees, …)</a:t>
+            </a:r>
+          </a:p>
+          <a:p>
+            <a:pPr marL="342900" indent="-342900">
+              <a:buFont typeface="+mj-lt"/>
+              <a:buAutoNum type="arabicPeriod"/>
+            </a:pPr>
+            <a:r>
+              <a:rPr lang="en-GB" dirty="0"/>
+              <a:t>Apply the </a:t>
+            </a:r>
+            <a:r>
+              <a:rPr lang="en-GB" dirty="0" err="1"/>
+              <a:t>modeling</a:t>
+            </a:r>
+            <a:r>
+              <a:rPr lang="en-GB" dirty="0"/>
+              <a:t> algorithm to the data</a:t>
+            </a:r>
+          </a:p>
+          <a:p>
+            <a:pPr marL="342900" indent="-342900">
+              <a:buFont typeface="+mj-lt"/>
+              <a:buAutoNum type="arabicPeriod"/>
+            </a:pPr>
+            <a:r>
+              <a:rPr lang="en-GB" dirty="0"/>
+              <a:t>Evaluate the model and identify the most predictive variables</a:t>
+            </a:r>
+          </a:p>
+          <a:p>
+            <a:pPr marL="342900" indent="-342900">
+              <a:buFont typeface="+mj-lt"/>
+              <a:buAutoNum type="arabicPeriod"/>
+            </a:pPr>
+            <a:r>
+              <a:rPr lang="en-GB" dirty="0"/>
+              <a:t>Use the model to predict customer propensity and develop targeted marketing campaigns.</a:t>
+            </a:r>
+          </a:p>
+        </p:txBody>
+      </p:sp>
+    </p:spTree>
+    <p:extLst>
+      <p:ext uri="{BB962C8B-B14F-4D97-AF65-F5344CB8AC3E}">
+        <p14:creationId xmlns:p14="http://schemas.microsoft.com/office/powerpoint/2010/main" val="3561995622"/>
+      </p:ext>
+    </p:extLst>
+  </p:cSld>
+  <p:clrMapOvr>
+    <a:masterClrMapping/>
+  </p:clrMapOvr>
+</p:sld>
+</file>
+
+<file path=ppt/slides/slide16.xml><?xml version="1.0" encoding="utf-8"?>
+<p:sld xmlns:a="http://schemas.openxmlformats.org/drawingml/2006/main" xmlns:r="http://schemas.openxmlformats.org/officeDocument/2006/relationships" xmlns:p="http://schemas.openxmlformats.org/presentationml/2006/main">
+  <p:cSld>
+    <p:spTree>
+      <p:nvGrpSpPr>
+        <p:cNvPr id="1" name="">
+          <a:extLst>
+            <a:ext uri="{FF2B5EF4-FFF2-40B4-BE49-F238E27FC236}">
+              <a16:creationId xmlns:a16="http://schemas.microsoft.com/office/drawing/2014/main" id="{31FCC128-2F29-539E-EEB4-85EE35005523}"/>
+            </a:ext>
+          </a:extLst>
+        </p:cNvPr>
+        <p:cNvGrpSpPr/>
+        <p:nvPr/>
+      </p:nvGrpSpPr>
+      <p:grpSpPr>
+        <a:xfrm>
+          <a:off x="0" y="0"/>
+          <a:ext cx="0" cy="0"/>
+          <a:chOff x="0" y="0"/>
+          <a:chExt cx="0" cy="0"/>
+        </a:xfrm>
+      </p:grpSpPr>
+      <p:sp>
+        <p:nvSpPr>
+          <p:cNvPr id="2" name="Title 1">
+            <a:extLst>
+              <a:ext uri="{FF2B5EF4-FFF2-40B4-BE49-F238E27FC236}">
+                <a16:creationId xmlns:a16="http://schemas.microsoft.com/office/drawing/2014/main" id="{304CA2DE-531B-321B-2E54-A0B088CC2824}"/>
+              </a:ext>
+            </a:extLst>
+          </p:cNvPr>
+          <p:cNvSpPr>
+            <a:spLocks noGrp="1"/>
+          </p:cNvSpPr>
+          <p:nvPr>
+            <p:ph type="title"/>
+          </p:nvPr>
+        </p:nvSpPr>
+        <p:spPr>
+          <a:xfrm>
+            <a:off x="248652" y="240632"/>
+            <a:ext cx="11726779" cy="457199"/>
+          </a:xfrm>
+        </p:spPr>
+        <p:txBody>
+          <a:bodyPr>
+            <a:noAutofit/>
+          </a:bodyPr>
+          <a:lstStyle/>
+          <a:p>
+            <a:r>
+              <a:rPr lang="en-GB" sz="2400" b="1" dirty="0">
+                <a:latin typeface="Helvetica" panose="020B0604020202020204" pitchFamily="34" charset="0"/>
+                <a:cs typeface="Helvetica" panose="020B0604020202020204" pitchFamily="34" charset="0"/>
+              </a:rPr>
+              <a:t>Propensity modelling</a:t>
+            </a:r>
+          </a:p>
+        </p:txBody>
+      </p:sp>
+      <p:sp>
+        <p:nvSpPr>
+          <p:cNvPr id="7" name="Content Placeholder 5">
+            <a:extLst>
+              <a:ext uri="{FF2B5EF4-FFF2-40B4-BE49-F238E27FC236}">
+                <a16:creationId xmlns:a16="http://schemas.microsoft.com/office/drawing/2014/main" id="{6D88F5C7-AFFA-D309-A704-67835AAC9486}"/>
+              </a:ext>
+            </a:extLst>
+          </p:cNvPr>
+          <p:cNvSpPr txBox="1">
+            <a:spLocks/>
+          </p:cNvSpPr>
+          <p:nvPr/>
+        </p:nvSpPr>
+        <p:spPr bwMode="white">
+          <a:xfrm>
+            <a:off x="334647" y="1155031"/>
+            <a:ext cx="11504427" cy="5462337"/>
+          </a:xfrm>
+          <a:prstGeom prst="rect">
+            <a:avLst/>
+          </a:prstGeom>
+        </p:spPr>
+        <p:txBody>
+          <a:bodyPr vert="horz" lIns="91440" tIns="45720" rIns="91440" bIns="45720" rtlCol="0" anchor="t" anchorCtr="0">
+            <a:normAutofit/>
+          </a:bodyPr>
+          <a:lstStyle>
+            <a:lvl1pPr marL="285750" indent="-285750" algn="l" defTabSz="457200" rtl="0" eaLnBrk="1" latinLnBrk="0" hangingPunct="1">
+              <a:spcBef>
+                <a:spcPts val="0"/>
+              </a:spcBef>
+              <a:spcAft>
+                <a:spcPts val="1000"/>
+              </a:spcAft>
+              <a:buClr>
+                <a:schemeClr val="tx1"/>
+              </a:buClr>
+              <a:buSzPct val="100000"/>
+              <a:buFont typeface="Arial"/>
+              <a:buChar char="•"/>
+              <a:defRPr sz="1800" kern="1200" cap="none">
+                <a:solidFill>
+                  <a:schemeClr val="tx1"/>
+                </a:solidFill>
+                <a:effectLst/>
+                <a:latin typeface="+mn-lt"/>
+                <a:ea typeface="+mn-ea"/>
+                <a:cs typeface="+mn-cs"/>
+              </a:defRPr>
+            </a:lvl1pPr>
+            <a:lvl2pPr marL="742950" indent="-285750" algn="l" defTabSz="457200" rtl="0" eaLnBrk="1" latinLnBrk="0" hangingPunct="1">
+              <a:spcBef>
+                <a:spcPts val="0"/>
+              </a:spcBef>
+              <a:spcAft>
+                <a:spcPts val="1000"/>
+              </a:spcAft>
+              <a:buClr>
+                <a:schemeClr val="tx1"/>
+              </a:buClr>
+              <a:buSzPct val="100000"/>
+              <a:buFont typeface="Arial"/>
+              <a:buChar char="•"/>
+              <a:defRPr sz="1600" kern="1200" cap="none">
+                <a:solidFill>
+                  <a:schemeClr val="tx1"/>
+                </a:solidFill>
+                <a:effectLst/>
+                <a:latin typeface="+mn-lt"/>
+                <a:ea typeface="+mn-ea"/>
+                <a:cs typeface="+mn-cs"/>
+              </a:defRPr>
+            </a:lvl2pPr>
+            <a:lvl3pPr marL="1200150" indent="-285750" algn="l" defTabSz="457200" rtl="0" eaLnBrk="1" latinLnBrk="0" hangingPunct="1">
+              <a:spcBef>
+                <a:spcPts val="0"/>
+              </a:spcBef>
+              <a:spcAft>
+                <a:spcPts val="1000"/>
+              </a:spcAft>
+              <a:buClr>
+                <a:schemeClr val="tx1"/>
+              </a:buClr>
+              <a:buSzPct val="100000"/>
+              <a:buFont typeface="Arial"/>
+              <a:buChar char="•"/>
+              <a:defRPr sz="1400" kern="1200" cap="none">
+                <a:solidFill>
+                  <a:schemeClr val="tx1"/>
+                </a:solidFill>
+                <a:effectLst/>
+                <a:latin typeface="+mn-lt"/>
+                <a:ea typeface="+mn-ea"/>
+                <a:cs typeface="+mn-cs"/>
+              </a:defRPr>
+            </a:lvl3pPr>
+            <a:lvl4pPr marL="1543050" indent="-171450" algn="l" defTabSz="457200" rtl="0" eaLnBrk="1" latinLnBrk="0" hangingPunct="1">
+              <a:spcBef>
+                <a:spcPts val="0"/>
+              </a:spcBef>
+              <a:spcAft>
+                <a:spcPts val="1000"/>
+              </a:spcAft>
+              <a:buClr>
+                <a:schemeClr val="tx1"/>
+              </a:buClr>
+              <a:buSzPct val="100000"/>
+              <a:buFont typeface="Arial"/>
+              <a:buChar char="•"/>
+              <a:defRPr sz="1200" kern="1200" cap="none">
+                <a:solidFill>
+                  <a:schemeClr val="tx1"/>
+                </a:solidFill>
+                <a:effectLst/>
+                <a:latin typeface="+mn-lt"/>
+                <a:ea typeface="+mn-ea"/>
+                <a:cs typeface="+mn-cs"/>
+              </a:defRPr>
+            </a:lvl4pPr>
+            <a:lvl5pPr marL="2000250" indent="-171450" algn="l" defTabSz="457200" rtl="0" eaLnBrk="1" latinLnBrk="0" hangingPunct="1">
+              <a:spcBef>
+                <a:spcPts val="0"/>
+              </a:spcBef>
+              <a:spcAft>
+                <a:spcPts val="1000"/>
+              </a:spcAft>
+              <a:buClr>
+                <a:schemeClr val="tx1"/>
+              </a:buClr>
+              <a:buSzPct val="100000"/>
+              <a:buFont typeface="Arial"/>
+              <a:buChar char="•"/>
+              <a:defRPr sz="1200" kern="1200" cap="none">
+                <a:solidFill>
+                  <a:schemeClr val="tx1"/>
+                </a:solidFill>
+                <a:effectLst/>
+                <a:latin typeface="+mn-lt"/>
+                <a:ea typeface="+mn-ea"/>
+                <a:cs typeface="+mn-cs"/>
+              </a:defRPr>
+            </a:lvl5pPr>
+            <a:lvl6pPr marL="2514600" indent="-228600" algn="l" defTabSz="457200" rtl="0" eaLnBrk="1" latinLnBrk="0" hangingPunct="1">
+              <a:spcBef>
+                <a:spcPts val="0"/>
+              </a:spcBef>
+              <a:spcAft>
+                <a:spcPts val="1000"/>
+              </a:spcAft>
+              <a:buClr>
+                <a:schemeClr val="tx1"/>
+              </a:buClr>
+              <a:buSzPct val="100000"/>
+              <a:buFont typeface="Arial"/>
+              <a:buChar char="•"/>
+              <a:defRPr sz="1200" kern="1200" cap="none">
+                <a:solidFill>
+                  <a:schemeClr val="tx1"/>
+                </a:solidFill>
+                <a:effectLst/>
+                <a:latin typeface="+mn-lt"/>
+                <a:ea typeface="+mn-ea"/>
+                <a:cs typeface="+mn-cs"/>
+              </a:defRPr>
+            </a:lvl6pPr>
+            <a:lvl7pPr marL="2971800" indent="-228600" algn="l" defTabSz="457200" rtl="0" eaLnBrk="1" latinLnBrk="0" hangingPunct="1">
+              <a:spcBef>
+                <a:spcPts val="0"/>
+              </a:spcBef>
+              <a:spcAft>
+                <a:spcPts val="1000"/>
+              </a:spcAft>
+              <a:buClr>
+                <a:schemeClr val="tx1"/>
+              </a:buClr>
+              <a:buSzPct val="100000"/>
+              <a:buFont typeface="Arial"/>
+              <a:buChar char="•"/>
+              <a:defRPr sz="1200" kern="1200" cap="none">
+                <a:solidFill>
+                  <a:schemeClr val="tx1"/>
+                </a:solidFill>
+                <a:effectLst/>
+                <a:latin typeface="+mn-lt"/>
+                <a:ea typeface="+mn-ea"/>
+                <a:cs typeface="+mn-cs"/>
+              </a:defRPr>
+            </a:lvl7pPr>
+            <a:lvl8pPr marL="3429000" indent="-228600" algn="l" defTabSz="457200" rtl="0" eaLnBrk="1" latinLnBrk="0" hangingPunct="1">
+              <a:spcBef>
+                <a:spcPts val="0"/>
+              </a:spcBef>
+              <a:spcAft>
+                <a:spcPts val="1000"/>
+              </a:spcAft>
+              <a:buClr>
+                <a:schemeClr val="tx1"/>
+              </a:buClr>
+              <a:buSzPct val="100000"/>
+              <a:buFont typeface="Arial"/>
+              <a:buChar char="•"/>
+              <a:defRPr sz="1200" kern="1200" cap="none">
+                <a:solidFill>
+                  <a:schemeClr val="tx1"/>
+                </a:solidFill>
+                <a:effectLst/>
+                <a:latin typeface="+mn-lt"/>
+                <a:ea typeface="+mn-ea"/>
+                <a:cs typeface="+mn-cs"/>
+              </a:defRPr>
+            </a:lvl8pPr>
+            <a:lvl9pPr marL="3886200" indent="-228600" algn="l" defTabSz="457200" rtl="0" eaLnBrk="1" latinLnBrk="0" hangingPunct="1">
+              <a:spcBef>
+                <a:spcPts val="0"/>
+              </a:spcBef>
+              <a:spcAft>
+                <a:spcPts val="1000"/>
+              </a:spcAft>
+              <a:buClr>
+                <a:schemeClr val="tx1"/>
+              </a:buClr>
+              <a:buSzPct val="100000"/>
+              <a:buFont typeface="Arial"/>
+              <a:buChar char="•"/>
+              <a:defRPr sz="1200" kern="1200" cap="none">
+                <a:solidFill>
+                  <a:schemeClr val="tx1"/>
+                </a:solidFill>
+                <a:effectLst/>
+                <a:latin typeface="+mn-lt"/>
+                <a:ea typeface="+mn-ea"/>
+                <a:cs typeface="+mn-cs"/>
+              </a:defRPr>
+            </a:lvl9pPr>
+          </a:lstStyle>
+          <a:p>
+            <a:pPr marL="0" indent="0" algn="ctr">
+              <a:buFont typeface="Arial"/>
+              <a:buNone/>
+            </a:pPr>
+            <a:endParaRPr lang="en-GB" sz="2800" dirty="0"/>
+          </a:p>
+          <a:p>
+            <a:pPr marL="0" indent="0" algn="ctr">
+              <a:buFont typeface="Arial"/>
+              <a:buNone/>
+            </a:pPr>
+            <a:endParaRPr lang="en-GB" sz="2800" dirty="0"/>
+          </a:p>
+          <a:p>
+            <a:pPr marL="0" indent="0" algn="ctr">
+              <a:buFont typeface="Arial"/>
+              <a:buNone/>
+            </a:pPr>
+            <a:endParaRPr lang="en-GB" sz="2800" dirty="0"/>
+          </a:p>
+          <a:p>
+            <a:pPr marL="0" indent="0" algn="ctr">
+              <a:buFont typeface="Arial"/>
+              <a:buNone/>
+            </a:pPr>
+            <a:endParaRPr lang="en-GB" sz="2800" dirty="0"/>
+          </a:p>
+          <a:p>
+            <a:pPr marL="0" indent="0" algn="ctr">
+              <a:buFont typeface="Arial"/>
+              <a:buNone/>
+            </a:pPr>
+            <a:r>
+              <a:rPr lang="en-GB" sz="2800" dirty="0"/>
+              <a:t>LAB: Propensity </a:t>
+            </a:r>
+            <a:r>
+              <a:rPr lang="en-GB" sz="2800" dirty="0" err="1"/>
+              <a:t>Modeling</a:t>
+            </a:r>
+            <a:endParaRPr lang="en-GB" sz="2800" dirty="0"/>
+          </a:p>
+        </p:txBody>
+      </p:sp>
+    </p:spTree>
+    <p:extLst>
+      <p:ext uri="{BB962C8B-B14F-4D97-AF65-F5344CB8AC3E}">
+        <p14:creationId xmlns:p14="http://schemas.microsoft.com/office/powerpoint/2010/main" val="1074798282"/>
+      </p:ext>
+    </p:extLst>
+  </p:cSld>
+  <p:clrMapOvr>
+    <a:masterClrMapping/>
+  </p:clrMapOvr>
+</p:sld>
+</file>
+
+<file path=ppt/slides/slide17.xml><?xml version="1.0" encoding="utf-8"?>
+<p:sld xmlns:a="http://schemas.openxmlformats.org/drawingml/2006/main" xmlns:r="http://schemas.openxmlformats.org/officeDocument/2006/relationships" xmlns:p="http://schemas.openxmlformats.org/presentationml/2006/main">
+  <p:cSld>
+    <p:spTree>
+      <p:nvGrpSpPr>
+        <p:cNvPr id="1" name="">
+          <a:extLst>
+            <a:ext uri="{FF2B5EF4-FFF2-40B4-BE49-F238E27FC236}">
+              <a16:creationId xmlns:a16="http://schemas.microsoft.com/office/drawing/2014/main" id="{BE81A7D8-53F4-6EA1-4138-12B5BAEA017C}"/>
+            </a:ext>
+          </a:extLst>
+        </p:cNvPr>
+        <p:cNvGrpSpPr/>
+        <p:nvPr/>
+      </p:nvGrpSpPr>
+      <p:grpSpPr>
+        <a:xfrm>
+          <a:off x="0" y="0"/>
+          <a:ext cx="0" cy="0"/>
+          <a:chOff x="0" y="0"/>
+          <a:chExt cx="0" cy="0"/>
+        </a:xfrm>
+      </p:grpSpPr>
+      <p:sp>
+        <p:nvSpPr>
+          <p:cNvPr id="2" name="Title 1">
+            <a:extLst>
+              <a:ext uri="{FF2B5EF4-FFF2-40B4-BE49-F238E27FC236}">
+                <a16:creationId xmlns:a16="http://schemas.microsoft.com/office/drawing/2014/main" id="{8BA3EB78-10E2-4548-989F-43F50ED57EA8}"/>
+              </a:ext>
+            </a:extLst>
+          </p:cNvPr>
+          <p:cNvSpPr>
+            <a:spLocks noGrp="1"/>
+          </p:cNvSpPr>
+          <p:nvPr>
+            <p:ph type="title"/>
+          </p:nvPr>
+        </p:nvSpPr>
+        <p:spPr>
+          <a:xfrm>
+            <a:off x="248652" y="240632"/>
+            <a:ext cx="11726779" cy="457199"/>
+          </a:xfrm>
+        </p:spPr>
+        <p:txBody>
+          <a:bodyPr>
+            <a:noAutofit/>
+          </a:bodyPr>
+          <a:lstStyle/>
+          <a:p>
+            <a:r>
+              <a:rPr lang="en-GB" sz="2400" b="1" dirty="0">
+                <a:latin typeface="Helvetica" panose="020B0604020202020204" pitchFamily="34" charset="0"/>
+                <a:cs typeface="Helvetica" panose="020B0604020202020204" pitchFamily="34" charset="0"/>
+              </a:rPr>
+              <a:t>Next best action (</a:t>
+            </a:r>
+            <a:r>
+              <a:rPr lang="en-GB" sz="2400" b="1" dirty="0" err="1">
+                <a:latin typeface="Helvetica" panose="020B0604020202020204" pitchFamily="34" charset="0"/>
+                <a:cs typeface="Helvetica" panose="020B0604020202020204" pitchFamily="34" charset="0"/>
+              </a:rPr>
+              <a:t>nba</a:t>
+            </a:r>
+            <a:r>
+              <a:rPr lang="en-GB" sz="2400" b="1" dirty="0">
+                <a:latin typeface="Helvetica" panose="020B0604020202020204" pitchFamily="34" charset="0"/>
+                <a:cs typeface="Helvetica" panose="020B0604020202020204" pitchFamily="34" charset="0"/>
+              </a:rPr>
+              <a:t>)</a:t>
+            </a:r>
+          </a:p>
+        </p:txBody>
+      </p:sp>
+      <p:sp>
+        <p:nvSpPr>
+          <p:cNvPr id="6" name="Content Placeholder 5">
+            <a:extLst>
+              <a:ext uri="{FF2B5EF4-FFF2-40B4-BE49-F238E27FC236}">
+                <a16:creationId xmlns:a16="http://schemas.microsoft.com/office/drawing/2014/main" id="{E9B58438-FCB4-A85D-8AE7-3F8B200470C8}"/>
+              </a:ext>
+            </a:extLst>
+          </p:cNvPr>
+          <p:cNvSpPr>
+            <a:spLocks noGrp="1"/>
+          </p:cNvSpPr>
+          <p:nvPr>
+            <p:ph idx="1"/>
+          </p:nvPr>
+        </p:nvSpPr>
+        <p:spPr>
+          <a:xfrm>
+            <a:off x="248652" y="898359"/>
+            <a:ext cx="6505074" cy="5959642"/>
+          </a:xfrm>
+        </p:spPr>
+        <p:txBody>
+          <a:bodyPr>
+            <a:normAutofit/>
+          </a:bodyPr>
+          <a:lstStyle/>
+          <a:p>
+            <a:pPr marL="0" indent="0">
+              <a:buNone/>
+            </a:pPr>
+            <a:r>
+              <a:rPr lang="en-GB" b="1" dirty="0"/>
+              <a:t>Definition</a:t>
+            </a:r>
+            <a:r>
+              <a:rPr lang="en-GB" dirty="0"/>
+              <a:t>: </a:t>
+            </a:r>
+            <a:r>
+              <a:rPr lang="en-GB" i="1" dirty="0"/>
+              <a:t>Next Best Action (NBA) is a technique used to determine the most effective action to take with a customer, based on their past behaviour, preferences, and other factors.</a:t>
+            </a:r>
+          </a:p>
+          <a:p>
+            <a:pPr marL="0" indent="0">
+              <a:buNone/>
+            </a:pPr>
+            <a:endParaRPr lang="en-GB" dirty="0"/>
+          </a:p>
+          <a:p>
+            <a:pPr marL="0" indent="0">
+              <a:buNone/>
+            </a:pPr>
+            <a:r>
+              <a:rPr lang="en-GB" b="1" dirty="0"/>
+              <a:t>Objectives</a:t>
+            </a:r>
+            <a:r>
+              <a:rPr lang="en-GB" dirty="0"/>
+              <a:t>: The objectives of NBA are to:</a:t>
+            </a:r>
+          </a:p>
+          <a:p>
+            <a:r>
+              <a:rPr lang="en-GB" dirty="0"/>
+              <a:t>Improve customer satisfaction and loyalty</a:t>
+            </a:r>
+          </a:p>
+          <a:p>
+            <a:r>
+              <a:rPr lang="en-GB" dirty="0"/>
+              <a:t>Increase sales and revenue</a:t>
+            </a:r>
+          </a:p>
+          <a:p>
+            <a:r>
+              <a:rPr lang="en-GB" dirty="0"/>
+              <a:t>Enhance customer experience</a:t>
+            </a:r>
+          </a:p>
+          <a:p>
+            <a:pPr marL="0" indent="0">
+              <a:buNone/>
+            </a:pPr>
+            <a:endParaRPr lang="en-GB" dirty="0"/>
+          </a:p>
+          <a:p>
+            <a:pPr marL="0" indent="0">
+              <a:buNone/>
+            </a:pPr>
+            <a:r>
+              <a:rPr lang="en-GB" b="1" dirty="0"/>
+              <a:t>Case studies:</a:t>
+            </a:r>
+          </a:p>
+          <a:p>
+            <a:pPr marL="0" indent="0">
+              <a:buNone/>
+            </a:pPr>
+            <a:r>
+              <a:rPr lang="en-GB" dirty="0"/>
+              <a:t>Company used NBA to determine the most effective channel to send customers marketing information, resulting in a 25% increase in customer satisfaction and a 15% increase in sales.</a:t>
+            </a:r>
+          </a:p>
+        </p:txBody>
+      </p:sp>
+      <p:pic>
+        <p:nvPicPr>
+          <p:cNvPr id="5122" name="Picture 2" descr="Next Best Action in Flows – User Guide">
+            <a:extLst>
+              <a:ext uri="{FF2B5EF4-FFF2-40B4-BE49-F238E27FC236}">
+                <a16:creationId xmlns:a16="http://schemas.microsoft.com/office/drawing/2014/main" id="{8B8373AB-CDD2-21F3-16E9-C0DB1EF524AD}"/>
+              </a:ext>
+            </a:extLst>
+          </p:cNvPr>
+          <p:cNvPicPr>
+            <a:picLocks noChangeAspect="1" noChangeArrowheads="1"/>
+          </p:cNvPicPr>
+          <p:nvPr/>
+        </p:nvPicPr>
+        <p:blipFill>
+          <a:blip r:embed="rId2">
+            <a:extLst>
+              <a:ext uri="{28A0092B-C50C-407E-A947-70E740481C1C}">
+                <a14:useLocalDpi xmlns:a14="http://schemas.microsoft.com/office/drawing/2010/main" val="0"/>
+              </a:ext>
+            </a:extLst>
+          </a:blip>
+          <a:srcRect/>
+          <a:stretch>
+            <a:fillRect/>
+          </a:stretch>
+        </p:blipFill>
+        <p:spPr bwMode="auto">
+          <a:xfrm>
+            <a:off x="6096000" y="1327484"/>
+            <a:ext cx="6017879" cy="4728411"/>
+          </a:xfrm>
+          <a:prstGeom prst="rect">
+            <a:avLst/>
+          </a:prstGeom>
+          <a:noFill/>
+          <a:extLst>
+            <a:ext uri="{909E8E84-426E-40DD-AFC4-6F175D3DCCD1}">
+              <a14:hiddenFill xmlns:a14="http://schemas.microsoft.com/office/drawing/2010/main">
+                <a:solidFill>
+                  <a:srgbClr val="FFFFFF"/>
+                </a:solidFill>
+              </a14:hiddenFill>
+            </a:ext>
+          </a:extLst>
+        </p:spPr>
+      </p:pic>
+    </p:spTree>
+    <p:extLst>
+      <p:ext uri="{BB962C8B-B14F-4D97-AF65-F5344CB8AC3E}">
+        <p14:creationId xmlns:p14="http://schemas.microsoft.com/office/powerpoint/2010/main" val="335589322"/>
+      </p:ext>
+    </p:extLst>
+  </p:cSld>
+  <p:clrMapOvr>
+    <a:masterClrMapping/>
+  </p:clrMapOvr>
+</p:sld>
+</file>
+
+<file path=ppt/slides/slide18.xml><?xml version="1.0" encoding="utf-8"?>
+<p:sld xmlns:a="http://schemas.openxmlformats.org/drawingml/2006/main" xmlns:r="http://schemas.openxmlformats.org/officeDocument/2006/relationships" xmlns:p="http://schemas.openxmlformats.org/presentationml/2006/main">
+  <p:cSld>
+    <p:spTree>
+      <p:nvGrpSpPr>
+        <p:cNvPr id="1" name="">
+          <a:extLst>
+            <a:ext uri="{FF2B5EF4-FFF2-40B4-BE49-F238E27FC236}">
+              <a16:creationId xmlns:a16="http://schemas.microsoft.com/office/drawing/2014/main" id="{C7FDC618-18C0-FCEC-7CA2-7AE8734D852C}"/>
+            </a:ext>
+          </a:extLst>
+        </p:cNvPr>
+        <p:cNvGrpSpPr/>
+        <p:nvPr/>
+      </p:nvGrpSpPr>
+      <p:grpSpPr>
+        <a:xfrm>
+          <a:off x="0" y="0"/>
+          <a:ext cx="0" cy="0"/>
+          <a:chOff x="0" y="0"/>
+          <a:chExt cx="0" cy="0"/>
+        </a:xfrm>
+      </p:grpSpPr>
+      <p:sp>
+        <p:nvSpPr>
+          <p:cNvPr id="2" name="Title 1">
+            <a:extLst>
+              <a:ext uri="{FF2B5EF4-FFF2-40B4-BE49-F238E27FC236}">
+                <a16:creationId xmlns:a16="http://schemas.microsoft.com/office/drawing/2014/main" id="{F86E2391-5106-7E2D-9DB7-2525DB9F2133}"/>
+              </a:ext>
+            </a:extLst>
+          </p:cNvPr>
+          <p:cNvSpPr>
+            <a:spLocks noGrp="1"/>
+          </p:cNvSpPr>
+          <p:nvPr>
+            <p:ph type="title"/>
+          </p:nvPr>
+        </p:nvSpPr>
+        <p:spPr>
+          <a:xfrm>
+            <a:off x="248652" y="240632"/>
+            <a:ext cx="11726779" cy="457199"/>
+          </a:xfrm>
+        </p:spPr>
+        <p:txBody>
+          <a:bodyPr>
+            <a:noAutofit/>
+          </a:bodyPr>
+          <a:lstStyle/>
+          <a:p>
+            <a:r>
+              <a:rPr lang="en-GB" sz="2400" b="1" dirty="0">
+                <a:latin typeface="Helvetica" panose="020B0604020202020204" pitchFamily="34" charset="0"/>
+                <a:cs typeface="Helvetica" panose="020B0604020202020204" pitchFamily="34" charset="0"/>
+              </a:rPr>
+              <a:t>Next best action (</a:t>
+            </a:r>
+            <a:r>
+              <a:rPr lang="en-GB" sz="2400" b="1" dirty="0" err="1">
+                <a:latin typeface="Helvetica" panose="020B0604020202020204" pitchFamily="34" charset="0"/>
+                <a:cs typeface="Helvetica" panose="020B0604020202020204" pitchFamily="34" charset="0"/>
+              </a:rPr>
+              <a:t>nba</a:t>
+            </a:r>
+            <a:r>
+              <a:rPr lang="en-GB" sz="2400" b="1" dirty="0">
+                <a:latin typeface="Helvetica" panose="020B0604020202020204" pitchFamily="34" charset="0"/>
+                <a:cs typeface="Helvetica" panose="020B0604020202020204" pitchFamily="34" charset="0"/>
+              </a:rPr>
+              <a:t>)</a:t>
+            </a:r>
+          </a:p>
+        </p:txBody>
+      </p:sp>
+      <p:sp>
+        <p:nvSpPr>
+          <p:cNvPr id="6" name="Content Placeholder 5">
+            <a:extLst>
+              <a:ext uri="{FF2B5EF4-FFF2-40B4-BE49-F238E27FC236}">
+                <a16:creationId xmlns:a16="http://schemas.microsoft.com/office/drawing/2014/main" id="{B568D6DB-1586-4398-9D3A-1AC88D93E6EA}"/>
+              </a:ext>
+            </a:extLst>
+          </p:cNvPr>
+          <p:cNvSpPr>
+            <a:spLocks noGrp="1"/>
+          </p:cNvSpPr>
+          <p:nvPr>
+            <p:ph idx="1"/>
+          </p:nvPr>
+        </p:nvSpPr>
+        <p:spPr>
+          <a:xfrm>
+            <a:off x="248652" y="898359"/>
+            <a:ext cx="6184232" cy="5959642"/>
+          </a:xfrm>
+        </p:spPr>
+        <p:txBody>
+          <a:bodyPr>
+            <a:normAutofit fontScale="92500" lnSpcReduction="10000"/>
+          </a:bodyPr>
+          <a:lstStyle/>
+          <a:p>
+            <a:pPr marL="0" indent="0">
+              <a:buNone/>
+            </a:pPr>
+            <a:r>
+              <a:rPr lang="en-GB" b="1" dirty="0"/>
+              <a:t>Required datasets</a:t>
+            </a:r>
+            <a:r>
+              <a:rPr lang="en-GB" dirty="0"/>
+              <a:t>:</a:t>
+            </a:r>
+          </a:p>
+          <a:p>
+            <a:r>
+              <a:rPr lang="en-GB" dirty="0"/>
+              <a:t>Customer demographic data (e.g. age, gender, location)</a:t>
+            </a:r>
+          </a:p>
+          <a:p>
+            <a:r>
+              <a:rPr lang="en-GB" dirty="0"/>
+              <a:t>Customer </a:t>
+            </a:r>
+            <a:r>
+              <a:rPr lang="en-GB" dirty="0" err="1"/>
+              <a:t>behavior</a:t>
+            </a:r>
+            <a:r>
+              <a:rPr lang="en-GB" dirty="0"/>
+              <a:t> data (e.g. purchase history, browsing history)</a:t>
+            </a:r>
+          </a:p>
+          <a:p>
+            <a:r>
+              <a:rPr lang="en-GB" dirty="0"/>
+              <a:t>Customer preference data (e.g. product preferences, communication preferences)</a:t>
+            </a:r>
+          </a:p>
+          <a:p>
+            <a:r>
+              <a:rPr lang="en-GB" dirty="0"/>
+              <a:t>Customer interaction data (e.g. website interactions, customer service interactions)</a:t>
+            </a:r>
+          </a:p>
+          <a:p>
+            <a:pPr marL="0" indent="0">
+              <a:buNone/>
+            </a:pPr>
+            <a:endParaRPr lang="en-GB" dirty="0"/>
+          </a:p>
+          <a:p>
+            <a:pPr marL="0" indent="0">
+              <a:buNone/>
+            </a:pPr>
+            <a:r>
+              <a:rPr lang="en-GB" b="1" dirty="0"/>
+              <a:t>Steps</a:t>
+            </a:r>
+            <a:r>
+              <a:rPr lang="en-GB" dirty="0"/>
+              <a:t>:</a:t>
+            </a:r>
+          </a:p>
+          <a:p>
+            <a:pPr marL="342900" indent="-342900">
+              <a:buFont typeface="+mj-lt"/>
+              <a:buAutoNum type="arabicPeriod"/>
+            </a:pPr>
+            <a:r>
+              <a:rPr lang="en-GB" dirty="0"/>
+              <a:t>Collect and clean the data</a:t>
+            </a:r>
+          </a:p>
+          <a:p>
+            <a:pPr marL="342900" indent="-342900">
+              <a:buFont typeface="+mj-lt"/>
+              <a:buAutoNum type="arabicPeriod"/>
+            </a:pPr>
+            <a:r>
+              <a:rPr lang="en-GB" dirty="0"/>
+              <a:t>Identify the variables to use for NBA (e.g. demographic, </a:t>
+            </a:r>
+            <a:r>
+              <a:rPr lang="en-GB" dirty="0" err="1"/>
+              <a:t>behavioral</a:t>
+            </a:r>
+            <a:r>
+              <a:rPr lang="en-GB" dirty="0"/>
+              <a:t>, preference)</a:t>
+            </a:r>
+          </a:p>
+          <a:p>
+            <a:pPr marL="342900" indent="-342900">
+              <a:buFont typeface="+mj-lt"/>
+              <a:buAutoNum type="arabicPeriod"/>
+            </a:pPr>
+            <a:r>
+              <a:rPr lang="en-GB" dirty="0"/>
+              <a:t>Choose a machine learning algorithm (e.g. decision trees, random forests)</a:t>
+            </a:r>
+          </a:p>
+          <a:p>
+            <a:pPr marL="342900" indent="-342900">
+              <a:buFont typeface="+mj-lt"/>
+              <a:buAutoNum type="arabicPeriod"/>
+            </a:pPr>
+            <a:r>
+              <a:rPr lang="en-GB" dirty="0"/>
+              <a:t>Train the model using the data</a:t>
+            </a:r>
+          </a:p>
+          <a:p>
+            <a:pPr marL="342900" indent="-342900">
+              <a:buFont typeface="+mj-lt"/>
+              <a:buAutoNum type="arabicPeriod"/>
+            </a:pPr>
+            <a:r>
+              <a:rPr lang="en-GB" dirty="0"/>
+              <a:t>Evaluate the model and identify the most effective actions</a:t>
+            </a:r>
+          </a:p>
+          <a:p>
+            <a:pPr marL="342900" indent="-342900">
+              <a:buFont typeface="+mj-lt"/>
+              <a:buAutoNum type="arabicPeriod"/>
+            </a:pPr>
+            <a:r>
+              <a:rPr lang="en-GB" dirty="0"/>
+              <a:t>Implement the actions and monitor the results</a:t>
+            </a:r>
+          </a:p>
+        </p:txBody>
+      </p:sp>
+      <p:pic>
+        <p:nvPicPr>
+          <p:cNvPr id="6152" name="Picture 8" descr="Next Best Action PowerPoint and Google Slides Template - PPT Slides">
+            <a:extLst>
+              <a:ext uri="{FF2B5EF4-FFF2-40B4-BE49-F238E27FC236}">
+                <a16:creationId xmlns:a16="http://schemas.microsoft.com/office/drawing/2014/main" id="{A0950A69-DA8B-F152-FBD1-35EDA24CA72F}"/>
+              </a:ext>
+            </a:extLst>
+          </p:cNvPr>
+          <p:cNvPicPr>
+            <a:picLocks noChangeAspect="1" noChangeArrowheads="1"/>
+          </p:cNvPicPr>
+          <p:nvPr/>
+        </p:nvPicPr>
+        <p:blipFill>
+          <a:blip r:embed="rId2">
+            <a:extLst>
+              <a:ext uri="{28A0092B-C50C-407E-A947-70E740481C1C}">
+                <a14:useLocalDpi xmlns:a14="http://schemas.microsoft.com/office/drawing/2010/main" val="0"/>
+              </a:ext>
+            </a:extLst>
+          </a:blip>
+          <a:srcRect/>
+          <a:stretch>
+            <a:fillRect/>
+          </a:stretch>
+        </p:blipFill>
+        <p:spPr bwMode="auto">
+          <a:xfrm>
+            <a:off x="6296526" y="898359"/>
+            <a:ext cx="5819273" cy="4364454"/>
+          </a:xfrm>
+          <a:prstGeom prst="rect">
+            <a:avLst/>
+          </a:prstGeom>
+          <a:noFill/>
+          <a:extLst>
+            <a:ext uri="{909E8E84-426E-40DD-AFC4-6F175D3DCCD1}">
+              <a14:hiddenFill xmlns:a14="http://schemas.microsoft.com/office/drawing/2010/main">
+                <a:solidFill>
+                  <a:srgbClr val="FFFFFF"/>
+                </a:solidFill>
+              </a14:hiddenFill>
+            </a:ext>
+          </a:extLst>
+        </p:spPr>
+      </p:pic>
+    </p:spTree>
+    <p:extLst>
+      <p:ext uri="{BB962C8B-B14F-4D97-AF65-F5344CB8AC3E}">
+        <p14:creationId xmlns:p14="http://schemas.microsoft.com/office/powerpoint/2010/main" val="887485827"/>
+      </p:ext>
+    </p:extLst>
+  </p:cSld>
+  <p:clrMapOvr>
+    <a:masterClrMapping/>
+  </p:clrMapOvr>
+</p:sld>
+</file>
+
+<file path=ppt/slides/slide19.xml><?xml version="1.0" encoding="utf-8"?>
+<p:sld xmlns:a="http://schemas.openxmlformats.org/drawingml/2006/main" xmlns:r="http://schemas.openxmlformats.org/officeDocument/2006/relationships" xmlns:p="http://schemas.openxmlformats.org/presentationml/2006/main">
+  <p:cSld>
+    <p:spTree>
+      <p:nvGrpSpPr>
+        <p:cNvPr id="1" name="">
+          <a:extLst>
+            <a:ext uri="{FF2B5EF4-FFF2-40B4-BE49-F238E27FC236}">
+              <a16:creationId xmlns:a16="http://schemas.microsoft.com/office/drawing/2014/main" id="{5A7A0421-69DE-D154-D4B2-491D29467B01}"/>
+            </a:ext>
+          </a:extLst>
+        </p:cNvPr>
+        <p:cNvGrpSpPr/>
+        <p:nvPr/>
+      </p:nvGrpSpPr>
+      <p:grpSpPr>
+        <a:xfrm>
+          <a:off x="0" y="0"/>
+          <a:ext cx="0" cy="0"/>
+          <a:chOff x="0" y="0"/>
+          <a:chExt cx="0" cy="0"/>
+        </a:xfrm>
+      </p:grpSpPr>
+      <p:sp>
+        <p:nvSpPr>
+          <p:cNvPr id="2" name="Title 1">
+            <a:extLst>
+              <a:ext uri="{FF2B5EF4-FFF2-40B4-BE49-F238E27FC236}">
+                <a16:creationId xmlns:a16="http://schemas.microsoft.com/office/drawing/2014/main" id="{9035A1E7-CD84-B1B7-B513-63FF65CEE01F}"/>
+              </a:ext>
+            </a:extLst>
+          </p:cNvPr>
+          <p:cNvSpPr>
+            <a:spLocks noGrp="1"/>
+          </p:cNvSpPr>
+          <p:nvPr>
+            <p:ph type="title"/>
+          </p:nvPr>
+        </p:nvSpPr>
+        <p:spPr>
+          <a:xfrm>
+            <a:off x="248652" y="240632"/>
+            <a:ext cx="11726779" cy="457199"/>
+          </a:xfrm>
+        </p:spPr>
+        <p:txBody>
+          <a:bodyPr>
+            <a:noAutofit/>
+          </a:bodyPr>
+          <a:lstStyle/>
+          <a:p>
+            <a:r>
+              <a:rPr lang="en-GB" sz="2400" b="1" dirty="0">
+                <a:latin typeface="Helvetica" panose="020B0604020202020204" pitchFamily="34" charset="0"/>
+                <a:cs typeface="Helvetica" panose="020B0604020202020204" pitchFamily="34" charset="0"/>
+              </a:rPr>
+              <a:t>Next best action (</a:t>
+            </a:r>
+            <a:r>
+              <a:rPr lang="en-GB" sz="2400" b="1" dirty="0" err="1">
+                <a:latin typeface="Helvetica" panose="020B0604020202020204" pitchFamily="34" charset="0"/>
+                <a:cs typeface="Helvetica" panose="020B0604020202020204" pitchFamily="34" charset="0"/>
+              </a:rPr>
+              <a:t>nba</a:t>
+            </a:r>
+            <a:r>
+              <a:rPr lang="en-GB" sz="2400" b="1" dirty="0">
+                <a:latin typeface="Helvetica" panose="020B0604020202020204" pitchFamily="34" charset="0"/>
+                <a:cs typeface="Helvetica" panose="020B0604020202020204" pitchFamily="34" charset="0"/>
+              </a:rPr>
+              <a:t>)</a:t>
+            </a:r>
+          </a:p>
+        </p:txBody>
+      </p:sp>
+      <p:sp>
+        <p:nvSpPr>
+          <p:cNvPr id="7" name="Content Placeholder 5">
+            <a:extLst>
+              <a:ext uri="{FF2B5EF4-FFF2-40B4-BE49-F238E27FC236}">
+                <a16:creationId xmlns:a16="http://schemas.microsoft.com/office/drawing/2014/main" id="{500EF554-A0AA-D3AB-EC16-EC387A9A3356}"/>
+              </a:ext>
+            </a:extLst>
+          </p:cNvPr>
+          <p:cNvSpPr txBox="1">
+            <a:spLocks/>
+          </p:cNvSpPr>
+          <p:nvPr/>
+        </p:nvSpPr>
+        <p:spPr bwMode="white">
+          <a:xfrm>
+            <a:off x="334647" y="1155031"/>
+            <a:ext cx="11504427" cy="5462337"/>
+          </a:xfrm>
+          <a:prstGeom prst="rect">
+            <a:avLst/>
+          </a:prstGeom>
+        </p:spPr>
+        <p:txBody>
+          <a:bodyPr vert="horz" lIns="91440" tIns="45720" rIns="91440" bIns="45720" rtlCol="0" anchor="t" anchorCtr="0">
+            <a:normAutofit/>
+          </a:bodyPr>
+          <a:lstStyle>
+            <a:lvl1pPr marL="285750" indent="-285750" algn="l" defTabSz="457200" rtl="0" eaLnBrk="1" latinLnBrk="0" hangingPunct="1">
+              <a:spcBef>
+                <a:spcPts val="0"/>
+              </a:spcBef>
+              <a:spcAft>
+                <a:spcPts val="1000"/>
+              </a:spcAft>
+              <a:buClr>
+                <a:schemeClr val="tx1"/>
+              </a:buClr>
+              <a:buSzPct val="100000"/>
+              <a:buFont typeface="Arial"/>
+              <a:buChar char="•"/>
+              <a:defRPr sz="1800" kern="1200" cap="none">
+                <a:solidFill>
+                  <a:schemeClr val="tx1"/>
+                </a:solidFill>
+                <a:effectLst/>
+                <a:latin typeface="+mn-lt"/>
+                <a:ea typeface="+mn-ea"/>
+                <a:cs typeface="+mn-cs"/>
+              </a:defRPr>
+            </a:lvl1pPr>
+            <a:lvl2pPr marL="742950" indent="-285750" algn="l" defTabSz="457200" rtl="0" eaLnBrk="1" latinLnBrk="0" hangingPunct="1">
+              <a:spcBef>
+                <a:spcPts val="0"/>
+              </a:spcBef>
+              <a:spcAft>
+                <a:spcPts val="1000"/>
+              </a:spcAft>
+              <a:buClr>
+                <a:schemeClr val="tx1"/>
+              </a:buClr>
+              <a:buSzPct val="100000"/>
+              <a:buFont typeface="Arial"/>
+              <a:buChar char="•"/>
+              <a:defRPr sz="1600" kern="1200" cap="none">
+                <a:solidFill>
+                  <a:schemeClr val="tx1"/>
+                </a:solidFill>
+                <a:effectLst/>
+                <a:latin typeface="+mn-lt"/>
+                <a:ea typeface="+mn-ea"/>
+                <a:cs typeface="+mn-cs"/>
+              </a:defRPr>
+            </a:lvl2pPr>
+            <a:lvl3pPr marL="1200150" indent="-285750" algn="l" defTabSz="457200" rtl="0" eaLnBrk="1" latinLnBrk="0" hangingPunct="1">
+              <a:spcBef>
+                <a:spcPts val="0"/>
+              </a:spcBef>
+              <a:spcAft>
+                <a:spcPts val="1000"/>
+              </a:spcAft>
+              <a:buClr>
+                <a:schemeClr val="tx1"/>
+              </a:buClr>
+              <a:buSzPct val="100000"/>
+              <a:buFont typeface="Arial"/>
+              <a:buChar char="•"/>
+              <a:defRPr sz="1400" kern="1200" cap="none">
+                <a:solidFill>
+                  <a:schemeClr val="tx1"/>
+                </a:solidFill>
+                <a:effectLst/>
+                <a:latin typeface="+mn-lt"/>
+                <a:ea typeface="+mn-ea"/>
+                <a:cs typeface="+mn-cs"/>
+              </a:defRPr>
+            </a:lvl3pPr>
+            <a:lvl4pPr marL="1543050" indent="-171450" algn="l" defTabSz="457200" rtl="0" eaLnBrk="1" latinLnBrk="0" hangingPunct="1">
+              <a:spcBef>
+                <a:spcPts val="0"/>
+              </a:spcBef>
+              <a:spcAft>
+                <a:spcPts val="1000"/>
+              </a:spcAft>
+              <a:buClr>
+                <a:schemeClr val="tx1"/>
+              </a:buClr>
+              <a:buSzPct val="100000"/>
+              <a:buFont typeface="Arial"/>
+              <a:buChar char="•"/>
+              <a:defRPr sz="1200" kern="1200" cap="none">
+                <a:solidFill>
+                  <a:schemeClr val="tx1"/>
+                </a:solidFill>
+                <a:effectLst/>
+                <a:latin typeface="+mn-lt"/>
+                <a:ea typeface="+mn-ea"/>
+                <a:cs typeface="+mn-cs"/>
+              </a:defRPr>
+            </a:lvl4pPr>
+            <a:lvl5pPr marL="2000250" indent="-171450" algn="l" defTabSz="457200" rtl="0" eaLnBrk="1" latinLnBrk="0" hangingPunct="1">
+              <a:spcBef>
+                <a:spcPts val="0"/>
+              </a:spcBef>
+              <a:spcAft>
+                <a:spcPts val="1000"/>
+              </a:spcAft>
+              <a:buClr>
+                <a:schemeClr val="tx1"/>
+              </a:buClr>
+              <a:buSzPct val="100000"/>
+              <a:buFont typeface="Arial"/>
+              <a:buChar char="•"/>
+              <a:defRPr sz="1200" kern="1200" cap="none">
+                <a:solidFill>
+                  <a:schemeClr val="tx1"/>
+                </a:solidFill>
+                <a:effectLst/>
+                <a:latin typeface="+mn-lt"/>
+                <a:ea typeface="+mn-ea"/>
+                <a:cs typeface="+mn-cs"/>
+              </a:defRPr>
+            </a:lvl5pPr>
+            <a:lvl6pPr marL="2514600" indent="-228600" algn="l" defTabSz="457200" rtl="0" eaLnBrk="1" latinLnBrk="0" hangingPunct="1">
+              <a:spcBef>
+                <a:spcPts val="0"/>
+              </a:spcBef>
+              <a:spcAft>
+                <a:spcPts val="1000"/>
+              </a:spcAft>
+              <a:buClr>
+                <a:schemeClr val="tx1"/>
+              </a:buClr>
+              <a:buSzPct val="100000"/>
+              <a:buFont typeface="Arial"/>
+              <a:buChar char="•"/>
+              <a:defRPr sz="1200" kern="1200" cap="none">
+                <a:solidFill>
+                  <a:schemeClr val="tx1"/>
+                </a:solidFill>
+                <a:effectLst/>
+                <a:latin typeface="+mn-lt"/>
+                <a:ea typeface="+mn-ea"/>
+                <a:cs typeface="+mn-cs"/>
+              </a:defRPr>
+            </a:lvl6pPr>
+            <a:lvl7pPr marL="2971800" indent="-228600" algn="l" defTabSz="457200" rtl="0" eaLnBrk="1" latinLnBrk="0" hangingPunct="1">
+              <a:spcBef>
+                <a:spcPts val="0"/>
+              </a:spcBef>
+              <a:spcAft>
+                <a:spcPts val="1000"/>
+              </a:spcAft>
+              <a:buClr>
+                <a:schemeClr val="tx1"/>
+              </a:buClr>
+              <a:buSzPct val="100000"/>
+              <a:buFont typeface="Arial"/>
+              <a:buChar char="•"/>
+              <a:defRPr sz="1200" kern="1200" cap="none">
+                <a:solidFill>
+                  <a:schemeClr val="tx1"/>
+                </a:solidFill>
+                <a:effectLst/>
+                <a:latin typeface="+mn-lt"/>
+                <a:ea typeface="+mn-ea"/>
+                <a:cs typeface="+mn-cs"/>
+              </a:defRPr>
+            </a:lvl7pPr>
+            <a:lvl8pPr marL="3429000" indent="-228600" algn="l" defTabSz="457200" rtl="0" eaLnBrk="1" latinLnBrk="0" hangingPunct="1">
+              <a:spcBef>
+                <a:spcPts val="0"/>
+              </a:spcBef>
+              <a:spcAft>
+                <a:spcPts val="1000"/>
+              </a:spcAft>
+              <a:buClr>
+                <a:schemeClr val="tx1"/>
+              </a:buClr>
+              <a:buSzPct val="100000"/>
+              <a:buFont typeface="Arial"/>
+              <a:buChar char="•"/>
+              <a:defRPr sz="1200" kern="1200" cap="none">
+                <a:solidFill>
+                  <a:schemeClr val="tx1"/>
+                </a:solidFill>
+                <a:effectLst/>
+                <a:latin typeface="+mn-lt"/>
+                <a:ea typeface="+mn-ea"/>
+                <a:cs typeface="+mn-cs"/>
+              </a:defRPr>
+            </a:lvl8pPr>
+            <a:lvl9pPr marL="3886200" indent="-228600" algn="l" defTabSz="457200" rtl="0" eaLnBrk="1" latinLnBrk="0" hangingPunct="1">
+              <a:spcBef>
+                <a:spcPts val="0"/>
+              </a:spcBef>
+              <a:spcAft>
+                <a:spcPts val="1000"/>
+              </a:spcAft>
+              <a:buClr>
+                <a:schemeClr val="tx1"/>
+              </a:buClr>
+              <a:buSzPct val="100000"/>
+              <a:buFont typeface="Arial"/>
+              <a:buChar char="•"/>
+              <a:defRPr sz="1200" kern="1200" cap="none">
+                <a:solidFill>
+                  <a:schemeClr val="tx1"/>
+                </a:solidFill>
+                <a:effectLst/>
+                <a:latin typeface="+mn-lt"/>
+                <a:ea typeface="+mn-ea"/>
+                <a:cs typeface="+mn-cs"/>
+              </a:defRPr>
+            </a:lvl9pPr>
+          </a:lstStyle>
+          <a:p>
+            <a:pPr marL="0" indent="0" algn="ctr">
+              <a:buFont typeface="Arial"/>
+              <a:buNone/>
+            </a:pPr>
+            <a:endParaRPr lang="en-GB" sz="2800" dirty="0"/>
+          </a:p>
+          <a:p>
+            <a:pPr marL="0" indent="0" algn="ctr">
+              <a:buFont typeface="Arial"/>
+              <a:buNone/>
+            </a:pPr>
+            <a:endParaRPr lang="en-GB" sz="2800" dirty="0"/>
+          </a:p>
+          <a:p>
+            <a:pPr marL="0" indent="0" algn="ctr">
+              <a:buFont typeface="Arial"/>
+              <a:buNone/>
+            </a:pPr>
+            <a:endParaRPr lang="en-GB" sz="2800" dirty="0"/>
+          </a:p>
+          <a:p>
+            <a:pPr marL="0" indent="0" algn="ctr">
+              <a:buFont typeface="Arial"/>
+              <a:buNone/>
+            </a:pPr>
+            <a:endParaRPr lang="en-GB" sz="2800" dirty="0"/>
+          </a:p>
+          <a:p>
+            <a:pPr marL="0" indent="0" algn="ctr">
+              <a:buFont typeface="Arial"/>
+              <a:buNone/>
+            </a:pPr>
+            <a:r>
+              <a:rPr lang="en-GB" sz="2800" dirty="0"/>
+              <a:t>LAB: Next Best Action</a:t>
+            </a:r>
+          </a:p>
+        </p:txBody>
+      </p:sp>
+    </p:spTree>
+    <p:extLst>
+      <p:ext uri="{BB962C8B-B14F-4D97-AF65-F5344CB8AC3E}">
+        <p14:creationId xmlns:p14="http://schemas.microsoft.com/office/powerpoint/2010/main" val="1183251839"/>
+      </p:ext>
+    </p:extLst>
+  </p:cSld>
+  <p:clrMapOvr>
+    <a:masterClrMapping/>
+  </p:clrMapOvr>
+</p:sld>
+</file>
+
 <file path=ppt/slides/slide2.xml><?xml version="1.0" encoding="utf-8"?>
 <p:sld xmlns:a="http://schemas.openxmlformats.org/drawingml/2006/main" xmlns:r="http://schemas.openxmlformats.org/officeDocument/2006/relationships" xmlns:p="http://schemas.openxmlformats.org/presentationml/2006/main">
   <p:cSld>
@@ -15448,6 +18490,199 @@
     <p:extLst>
       <p:ext uri="{BB962C8B-B14F-4D97-AF65-F5344CB8AC3E}">
         <p14:creationId xmlns:p14="http://schemas.microsoft.com/office/powerpoint/2010/main" val="3645492487"/>
+      </p:ext>
+    </p:extLst>
+  </p:cSld>
+  <p:clrMapOvr>
+    <a:masterClrMapping/>
+  </p:clrMapOvr>
+</p:sld>
+</file>
+
+<file path=ppt/slides/slide20.xml><?xml version="1.0" encoding="utf-8"?>
+<p:sld xmlns:a="http://schemas.openxmlformats.org/drawingml/2006/main" xmlns:r="http://schemas.openxmlformats.org/officeDocument/2006/relationships" xmlns:p="http://schemas.openxmlformats.org/presentationml/2006/main">
+  <p:cSld>
+    <p:spTree>
+      <p:nvGrpSpPr>
+        <p:cNvPr id="1" name="">
+          <a:extLst>
+            <a:ext uri="{FF2B5EF4-FFF2-40B4-BE49-F238E27FC236}">
+              <a16:creationId xmlns:a16="http://schemas.microsoft.com/office/drawing/2014/main" id="{CF60925D-E2F4-BE27-85FD-5ADD06F373D6}"/>
+            </a:ext>
+          </a:extLst>
+        </p:cNvPr>
+        <p:cNvGrpSpPr/>
+        <p:nvPr/>
+      </p:nvGrpSpPr>
+      <p:grpSpPr>
+        <a:xfrm>
+          <a:off x="0" y="0"/>
+          <a:ext cx="0" cy="0"/>
+          <a:chOff x="0" y="0"/>
+          <a:chExt cx="0" cy="0"/>
+        </a:xfrm>
+      </p:grpSpPr>
+      <p:sp>
+        <p:nvSpPr>
+          <p:cNvPr id="2" name="Title 1">
+            <a:extLst>
+              <a:ext uri="{FF2B5EF4-FFF2-40B4-BE49-F238E27FC236}">
+                <a16:creationId xmlns:a16="http://schemas.microsoft.com/office/drawing/2014/main" id="{6B63EE54-E621-5156-8EE2-6382A4AEFB06}"/>
+              </a:ext>
+            </a:extLst>
+          </p:cNvPr>
+          <p:cNvSpPr>
+            <a:spLocks noGrp="1"/>
+          </p:cNvSpPr>
+          <p:nvPr>
+            <p:ph type="title"/>
+          </p:nvPr>
+        </p:nvSpPr>
+        <p:spPr>
+          <a:xfrm>
+            <a:off x="248652" y="240632"/>
+            <a:ext cx="11726779" cy="457199"/>
+          </a:xfrm>
+        </p:spPr>
+        <p:txBody>
+          <a:bodyPr>
+            <a:noAutofit/>
+          </a:bodyPr>
+          <a:lstStyle/>
+          <a:p>
+            <a:r>
+              <a:rPr lang="en-GB" sz="2400" b="1" dirty="0">
+                <a:latin typeface="Helvetica" panose="020B0604020202020204" pitchFamily="34" charset="0"/>
+                <a:cs typeface="Helvetica" panose="020B0604020202020204" pitchFamily="34" charset="0"/>
+              </a:rPr>
+              <a:t>Other popular customer analysis</a:t>
+            </a:r>
+          </a:p>
+        </p:txBody>
+      </p:sp>
+      <p:sp>
+        <p:nvSpPr>
+          <p:cNvPr id="6" name="Content Placeholder 5">
+            <a:extLst>
+              <a:ext uri="{FF2B5EF4-FFF2-40B4-BE49-F238E27FC236}">
+                <a16:creationId xmlns:a16="http://schemas.microsoft.com/office/drawing/2014/main" id="{CDFBCCA0-66E3-33F7-DAF9-DB403299760A}"/>
+              </a:ext>
+            </a:extLst>
+          </p:cNvPr>
+          <p:cNvSpPr>
+            <a:spLocks noGrp="1"/>
+          </p:cNvSpPr>
+          <p:nvPr>
+            <p:ph idx="1"/>
+          </p:nvPr>
+        </p:nvSpPr>
+        <p:spPr>
+          <a:xfrm>
+            <a:off x="334647" y="1155031"/>
+            <a:ext cx="11640784" cy="5462337"/>
+          </a:xfrm>
+        </p:spPr>
+        <p:txBody>
+          <a:bodyPr>
+            <a:normAutofit/>
+          </a:bodyPr>
+          <a:lstStyle/>
+          <a:p>
+            <a:r>
+              <a:rPr lang="en-GB" dirty="0"/>
+              <a:t>Next Best Offer (NBO): NBO is a technique used to determine the most relevant offer or recommendation for a customer based on their past </a:t>
+            </a:r>
+            <a:r>
+              <a:rPr lang="en-GB" dirty="0" err="1"/>
+              <a:t>behavior</a:t>
+            </a:r>
+            <a:r>
+              <a:rPr lang="en-GB" dirty="0"/>
+              <a:t>, preferences, and other factors.</a:t>
+            </a:r>
+          </a:p>
+          <a:p>
+            <a:r>
+              <a:rPr lang="en-GB" dirty="0"/>
+              <a:t>Customer Journey Mapping: This involves </a:t>
+            </a:r>
+            <a:r>
+              <a:rPr lang="en-GB" dirty="0" err="1"/>
+              <a:t>analyzing</a:t>
+            </a:r>
+            <a:r>
+              <a:rPr lang="en-GB" dirty="0"/>
+              <a:t> the customer's journey across multiple touchpoints and channels to identify pain points, opportunities, and areas for improvement.</a:t>
+            </a:r>
+          </a:p>
+          <a:p>
+            <a:r>
+              <a:rPr lang="en-GB" dirty="0"/>
+              <a:t>Sentiment Analysis: Sentiment analysis involves </a:t>
+            </a:r>
+            <a:r>
+              <a:rPr lang="en-GB" dirty="0" err="1"/>
+              <a:t>analyzing</a:t>
+            </a:r>
+            <a:r>
+              <a:rPr lang="en-GB" dirty="0"/>
+              <a:t> customer feedback, reviews, and social media posts to understand their emotions and opinions about a product or service.</a:t>
+            </a:r>
+          </a:p>
+          <a:p>
+            <a:r>
+              <a:rPr lang="en-GB" dirty="0"/>
+              <a:t>Predictive Maintenance: Predictive maintenance involves using machine learning algorithms to predict when a customer is likely to experience a problem or issue with a product or service.</a:t>
+            </a:r>
+          </a:p>
+          <a:p>
+            <a:r>
+              <a:rPr lang="en-GB" dirty="0"/>
+              <a:t>Personalization: Personalization involves using AI/ML to create tailored experiences for customers based on their </a:t>
+            </a:r>
+            <a:r>
+              <a:rPr lang="en-GB" dirty="0" err="1"/>
+              <a:t>behavior</a:t>
+            </a:r>
+            <a:r>
+              <a:rPr lang="en-GB" dirty="0"/>
+              <a:t>, preferences, and other characteristics.</a:t>
+            </a:r>
+          </a:p>
+          <a:p>
+            <a:r>
+              <a:rPr lang="en-GB" dirty="0"/>
+              <a:t>Customer Lifetime Value (CLV): CLV involves </a:t>
+            </a:r>
+            <a:r>
+              <a:rPr lang="en-GB" dirty="0" err="1"/>
+              <a:t>analyzing</a:t>
+            </a:r>
+            <a:r>
+              <a:rPr lang="en-GB" dirty="0"/>
+              <a:t> the total value of a customer over their lifetime, including their past purchases, future potential, and other factors.</a:t>
+            </a:r>
+          </a:p>
+          <a:p>
+            <a:r>
+              <a:rPr lang="en-GB" dirty="0"/>
+              <a:t>Customer Health Score: Customer health score involves </a:t>
+            </a:r>
+            <a:r>
+              <a:rPr lang="en-GB" dirty="0" err="1"/>
+              <a:t>analyzing</a:t>
+            </a:r>
+            <a:r>
+              <a:rPr lang="en-GB" dirty="0"/>
+              <a:t> various metrics, such as engagement, satisfaction, and loyalty, to determine the overall health of a customer relationship.</a:t>
+            </a:r>
+          </a:p>
+        </p:txBody>
+      </p:sp>
+    </p:spTree>
+    <p:extLst>
+      <p:ext uri="{BB962C8B-B14F-4D97-AF65-F5344CB8AC3E}">
+        <p14:creationId xmlns:p14="http://schemas.microsoft.com/office/powerpoint/2010/main" val="935775528"/>
       </p:ext>
     </p:extLst>
   </p:cSld>
@@ -17876,10 +21111,10 @@
       </p:sp>
       <p:pic>
         <p:nvPicPr>
-          <p:cNvPr id="1026" name="Picture 2" descr="Benefits of Churn Analytics | Why Churn Analytics is Important">
+          <p:cNvPr id="3074" name="Picture 2">
             <a:extLst>
               <a:ext uri="{FF2B5EF4-FFF2-40B4-BE49-F238E27FC236}">
-                <a16:creationId xmlns:a16="http://schemas.microsoft.com/office/drawing/2014/main" id="{3A63751C-4D1E-81E0-35C2-04233B2B54C8}"/>
+                <a16:creationId xmlns:a16="http://schemas.microsoft.com/office/drawing/2014/main" id="{0DDD36D9-D5B1-D22D-5B43-9395E22DFBA1}"/>
               </a:ext>
             </a:extLst>
           </p:cNvPr>
@@ -17888,7 +21123,7 @@
           </p:cNvPicPr>
           <p:nvPr/>
         </p:nvPicPr>
-        <p:blipFill rotWithShape="1">
+        <p:blipFill>
           <a:blip r:embed="rId2">
             <a:extLst>
               <a:ext uri="{28A0092B-C50C-407E-A947-70E740481C1C}">
@@ -17896,13 +21131,15 @@
               </a:ext>
             </a:extLst>
           </a:blip>
-          <a:srcRect l="30000" t="20894"/>
-          <a:stretch/>
+          <a:srcRect/>
+          <a:stretch>
+            <a:fillRect/>
+          </a:stretch>
         </p:blipFill>
         <p:spPr bwMode="auto">
           <a:xfrm>
-            <a:off x="6294289" y="1283368"/>
-            <a:ext cx="5654842" cy="3373826"/>
+            <a:off x="6074393" y="874293"/>
+            <a:ext cx="6148464" cy="4924927"/>
           </a:xfrm>
           <a:prstGeom prst="rect">
             <a:avLst/>

</xml_diff>